<commit_message>
Updated schema chart of wbc2 and its surrounding modules.
</commit_message>
<xml_diff>
--- a/docs/wbc2_schema.pptx
+++ b/docs/wbc2_schema.pptx
@@ -6,7 +6,6 @@
   </p:sldMasterIdLst>
   <p:sldIdLst>
     <p:sldId id="256" r:id="rId3"/>
-    <p:sldId id="257" r:id="rId4"/>
   </p:sldIdLst>
   <p:sldSz cx="10080625" cy="5670550"/>
   <p:notesSz cx="7772400" cy="10058400"/>
@@ -54,7 +53,7 @@
       </p:grpSpPr>
       <p:sp>
         <p:nvSpPr>
-          <p:cNvPr id="26" name="PlaceHolder 1"/>
+          <p:cNvPr id="23" name="PlaceHolder 1"/>
           <p:cNvSpPr>
             <a:spLocks noGrp="1"/>
           </p:cNvSpPr>
@@ -65,7 +64,7 @@
         <p:spPr>
           <a:xfrm>
             <a:off x="504000" y="226080"/>
-            <a:ext cx="9071640" cy="946440"/>
+            <a:ext cx="9071640" cy="946080"/>
           </a:xfrm>
           <a:prstGeom prst="rect">
             <a:avLst/>
@@ -83,7 +82,7 @@
       </p:sp>
       <p:sp>
         <p:nvSpPr>
-          <p:cNvPr id="27" name="PlaceHolder 2"/>
+          <p:cNvPr id="24" name="PlaceHolder 2"/>
           <p:cNvSpPr>
             <a:spLocks noGrp="1"/>
           </p:cNvSpPr>
@@ -94,7 +93,7 @@
         <p:spPr>
           <a:xfrm>
             <a:off x="504000" y="1326600"/>
-            <a:ext cx="9071640" cy="1568160"/>
+            <a:ext cx="9072000" cy="1568520"/>
           </a:xfrm>
           <a:prstGeom prst="rect">
             <a:avLst/>
@@ -113,7 +112,7 @@
       </p:sp>
       <p:sp>
         <p:nvSpPr>
-          <p:cNvPr id="28" name="PlaceHolder 3"/>
+          <p:cNvPr id="25" name="PlaceHolder 3"/>
           <p:cNvSpPr>
             <a:spLocks noGrp="1"/>
           </p:cNvSpPr>
@@ -123,8 +122,8 @@
         </p:nvSpPr>
         <p:spPr>
           <a:xfrm>
-            <a:off x="504000" y="3044160"/>
-            <a:ext cx="9071640" cy="1568160"/>
+            <a:off x="504000" y="3044520"/>
+            <a:ext cx="9072000" cy="1568520"/>
           </a:xfrm>
           <a:prstGeom prst="rect">
             <a:avLst/>
@@ -165,7 +164,7 @@
       </p:grpSpPr>
       <p:sp>
         <p:nvSpPr>
-          <p:cNvPr id="29" name="PlaceHolder 1"/>
+          <p:cNvPr id="26" name="PlaceHolder 1"/>
           <p:cNvSpPr>
             <a:spLocks noGrp="1"/>
           </p:cNvSpPr>
@@ -176,7 +175,7 @@
         <p:spPr>
           <a:xfrm>
             <a:off x="504000" y="226080"/>
-            <a:ext cx="9071640" cy="946440"/>
+            <a:ext cx="9071640" cy="946080"/>
           </a:xfrm>
           <a:prstGeom prst="rect">
             <a:avLst/>
@@ -194,7 +193,7 @@
       </p:sp>
       <p:sp>
         <p:nvSpPr>
-          <p:cNvPr id="30" name="PlaceHolder 2"/>
+          <p:cNvPr id="27" name="PlaceHolder 2"/>
           <p:cNvSpPr>
             <a:spLocks noGrp="1"/>
           </p:cNvSpPr>
@@ -205,7 +204,7 @@
         <p:spPr>
           <a:xfrm>
             <a:off x="504000" y="1326600"/>
-            <a:ext cx="4426920" cy="1568160"/>
+            <a:ext cx="4426920" cy="1568520"/>
           </a:xfrm>
           <a:prstGeom prst="rect">
             <a:avLst/>
@@ -224,7 +223,7 @@
       </p:sp>
       <p:sp>
         <p:nvSpPr>
-          <p:cNvPr id="31" name="PlaceHolder 3"/>
+          <p:cNvPr id="28" name="PlaceHolder 3"/>
           <p:cNvSpPr>
             <a:spLocks noGrp="1"/>
           </p:cNvSpPr>
@@ -235,7 +234,7 @@
         <p:spPr>
           <a:xfrm>
             <a:off x="5152680" y="1326600"/>
-            <a:ext cx="4426920" cy="1568160"/>
+            <a:ext cx="4426920" cy="1568520"/>
           </a:xfrm>
           <a:prstGeom prst="rect">
             <a:avLst/>
@@ -254,7 +253,7 @@
       </p:sp>
       <p:sp>
         <p:nvSpPr>
-          <p:cNvPr id="32" name="PlaceHolder 4"/>
+          <p:cNvPr id="29" name="PlaceHolder 4"/>
           <p:cNvSpPr>
             <a:spLocks noGrp="1"/>
           </p:cNvSpPr>
@@ -264,8 +263,8 @@
         </p:nvSpPr>
         <p:spPr>
           <a:xfrm>
-            <a:off x="504000" y="3044160"/>
-            <a:ext cx="4426920" cy="1568160"/>
+            <a:off x="504000" y="3044520"/>
+            <a:ext cx="4426920" cy="1568520"/>
           </a:xfrm>
           <a:prstGeom prst="rect">
             <a:avLst/>
@@ -284,7 +283,7 @@
       </p:sp>
       <p:sp>
         <p:nvSpPr>
-          <p:cNvPr id="33" name="PlaceHolder 5"/>
+          <p:cNvPr id="30" name="PlaceHolder 5"/>
           <p:cNvSpPr>
             <a:spLocks noGrp="1"/>
           </p:cNvSpPr>
@@ -294,8 +293,8 @@
         </p:nvSpPr>
         <p:spPr>
           <a:xfrm>
-            <a:off x="5152680" y="3044160"/>
-            <a:ext cx="4426920" cy="1568160"/>
+            <a:off x="5152680" y="3044520"/>
+            <a:ext cx="4426920" cy="1568520"/>
           </a:xfrm>
           <a:prstGeom prst="rect">
             <a:avLst/>
@@ -336,7 +335,7 @@
       </p:grpSpPr>
       <p:sp>
         <p:nvSpPr>
-          <p:cNvPr id="34" name="PlaceHolder 1"/>
+          <p:cNvPr id="31" name="PlaceHolder 1"/>
           <p:cNvSpPr>
             <a:spLocks noGrp="1"/>
           </p:cNvSpPr>
@@ -347,7 +346,7 @@
         <p:spPr>
           <a:xfrm>
             <a:off x="504000" y="226080"/>
-            <a:ext cx="9071640" cy="946440"/>
+            <a:ext cx="9071640" cy="946080"/>
           </a:xfrm>
           <a:prstGeom prst="rect">
             <a:avLst/>
@@ -365,7 +364,7 @@
       </p:sp>
       <p:sp>
         <p:nvSpPr>
-          <p:cNvPr id="35" name="PlaceHolder 2"/>
+          <p:cNvPr id="32" name="PlaceHolder 2"/>
           <p:cNvSpPr>
             <a:spLocks noGrp="1"/>
           </p:cNvSpPr>
@@ -376,7 +375,7 @@
         <p:spPr>
           <a:xfrm>
             <a:off x="504000" y="1326600"/>
-            <a:ext cx="2920680" cy="1568160"/>
+            <a:ext cx="2921040" cy="1568520"/>
           </a:xfrm>
           <a:prstGeom prst="rect">
             <a:avLst/>
@@ -395,7 +394,7 @@
       </p:sp>
       <p:sp>
         <p:nvSpPr>
-          <p:cNvPr id="36" name="PlaceHolder 3"/>
+          <p:cNvPr id="33" name="PlaceHolder 3"/>
           <p:cNvSpPr>
             <a:spLocks noGrp="1"/>
           </p:cNvSpPr>
@@ -405,8 +404,8 @@
         </p:nvSpPr>
         <p:spPr>
           <a:xfrm>
-            <a:off x="3571200" y="1326600"/>
-            <a:ext cx="2920680" cy="1568160"/>
+            <a:off x="3571560" y="1326600"/>
+            <a:ext cx="2921040" cy="1568520"/>
           </a:xfrm>
           <a:prstGeom prst="rect">
             <a:avLst/>
@@ -425,7 +424,7 @@
       </p:sp>
       <p:sp>
         <p:nvSpPr>
-          <p:cNvPr id="37" name="PlaceHolder 4"/>
+          <p:cNvPr id="34" name="PlaceHolder 4"/>
           <p:cNvSpPr>
             <a:spLocks noGrp="1"/>
           </p:cNvSpPr>
@@ -435,8 +434,8 @@
         </p:nvSpPr>
         <p:spPr>
           <a:xfrm>
-            <a:off x="6638040" y="1326600"/>
-            <a:ext cx="2920680" cy="1568160"/>
+            <a:off x="6639120" y="1326600"/>
+            <a:ext cx="2921040" cy="1568520"/>
           </a:xfrm>
           <a:prstGeom prst="rect">
             <a:avLst/>
@@ -455,7 +454,7 @@
       </p:sp>
       <p:sp>
         <p:nvSpPr>
-          <p:cNvPr id="38" name="PlaceHolder 5"/>
+          <p:cNvPr id="35" name="PlaceHolder 5"/>
           <p:cNvSpPr>
             <a:spLocks noGrp="1"/>
           </p:cNvSpPr>
@@ -465,8 +464,8 @@
         </p:nvSpPr>
         <p:spPr>
           <a:xfrm>
-            <a:off x="504000" y="3044160"/>
-            <a:ext cx="2920680" cy="1568160"/>
+            <a:off x="504000" y="3044520"/>
+            <a:ext cx="2921040" cy="1568520"/>
           </a:xfrm>
           <a:prstGeom prst="rect">
             <a:avLst/>
@@ -485,7 +484,7 @@
       </p:sp>
       <p:sp>
         <p:nvSpPr>
-          <p:cNvPr id="39" name="PlaceHolder 6"/>
+          <p:cNvPr id="36" name="PlaceHolder 6"/>
           <p:cNvSpPr>
             <a:spLocks noGrp="1"/>
           </p:cNvSpPr>
@@ -495,8 +494,8 @@
         </p:nvSpPr>
         <p:spPr>
           <a:xfrm>
-            <a:off x="3571200" y="3044160"/>
-            <a:ext cx="2920680" cy="1568160"/>
+            <a:off x="3571560" y="3044520"/>
+            <a:ext cx="2921040" cy="1568520"/>
           </a:xfrm>
           <a:prstGeom prst="rect">
             <a:avLst/>
@@ -515,7 +514,7 @@
       </p:sp>
       <p:sp>
         <p:nvSpPr>
-          <p:cNvPr id="40" name="PlaceHolder 7"/>
+          <p:cNvPr id="37" name="PlaceHolder 7"/>
           <p:cNvSpPr>
             <a:spLocks noGrp="1"/>
           </p:cNvSpPr>
@@ -525,8 +524,8 @@
         </p:nvSpPr>
         <p:spPr>
           <a:xfrm>
-            <a:off x="6638040" y="3044160"/>
-            <a:ext cx="2920680" cy="1568160"/>
+            <a:off x="6639120" y="3044520"/>
+            <a:ext cx="2921040" cy="1568520"/>
           </a:xfrm>
           <a:prstGeom prst="rect">
             <a:avLst/>
@@ -567,7 +566,7 @@
       </p:grpSpPr>
       <p:sp>
         <p:nvSpPr>
-          <p:cNvPr id="5" name="PlaceHolder 1"/>
+          <p:cNvPr id="2" name="PlaceHolder 1"/>
           <p:cNvSpPr>
             <a:spLocks noGrp="1"/>
           </p:cNvSpPr>
@@ -578,7 +577,7 @@
         <p:spPr>
           <a:xfrm>
             <a:off x="504000" y="226080"/>
-            <a:ext cx="9071640" cy="946440"/>
+            <a:ext cx="9071640" cy="946080"/>
           </a:xfrm>
           <a:prstGeom prst="rect">
             <a:avLst/>
@@ -596,7 +595,7 @@
       </p:sp>
       <p:sp>
         <p:nvSpPr>
-          <p:cNvPr id="6" name="PlaceHolder 2"/>
+          <p:cNvPr id="3" name="PlaceHolder 2"/>
           <p:cNvSpPr>
             <a:spLocks noGrp="1"/>
           </p:cNvSpPr>
@@ -607,7 +606,7 @@
         <p:spPr>
           <a:xfrm>
             <a:off x="504000" y="1326600"/>
-            <a:ext cx="9071640" cy="3288240"/>
+            <a:ext cx="9072000" cy="3288600"/>
           </a:xfrm>
           <a:prstGeom prst="rect">
             <a:avLst/>
@@ -647,7 +646,7 @@
       </p:grpSpPr>
       <p:sp>
         <p:nvSpPr>
-          <p:cNvPr id="7" name="PlaceHolder 1"/>
+          <p:cNvPr id="4" name="PlaceHolder 1"/>
           <p:cNvSpPr>
             <a:spLocks noGrp="1"/>
           </p:cNvSpPr>
@@ -658,7 +657,7 @@
         <p:spPr>
           <a:xfrm>
             <a:off x="504000" y="226080"/>
-            <a:ext cx="9071640" cy="946440"/>
+            <a:ext cx="9071640" cy="946080"/>
           </a:xfrm>
           <a:prstGeom prst="rect">
             <a:avLst/>
@@ -676,7 +675,7 @@
       </p:sp>
       <p:sp>
         <p:nvSpPr>
-          <p:cNvPr id="8" name="PlaceHolder 2"/>
+          <p:cNvPr id="5" name="PlaceHolder 2"/>
           <p:cNvSpPr>
             <a:spLocks noGrp="1"/>
           </p:cNvSpPr>
@@ -687,7 +686,7 @@
         <p:spPr>
           <a:xfrm>
             <a:off x="504000" y="1326600"/>
-            <a:ext cx="9071640" cy="3288240"/>
+            <a:ext cx="9072000" cy="3288600"/>
           </a:xfrm>
           <a:prstGeom prst="rect">
             <a:avLst/>
@@ -728,7 +727,7 @@
       </p:grpSpPr>
       <p:sp>
         <p:nvSpPr>
-          <p:cNvPr id="9" name="PlaceHolder 1"/>
+          <p:cNvPr id="6" name="PlaceHolder 1"/>
           <p:cNvSpPr>
             <a:spLocks noGrp="1"/>
           </p:cNvSpPr>
@@ -739,7 +738,7 @@
         <p:spPr>
           <a:xfrm>
             <a:off x="504000" y="226080"/>
-            <a:ext cx="9071640" cy="946440"/>
+            <a:ext cx="9071640" cy="946080"/>
           </a:xfrm>
           <a:prstGeom prst="rect">
             <a:avLst/>
@@ -757,7 +756,7 @@
       </p:sp>
       <p:sp>
         <p:nvSpPr>
-          <p:cNvPr id="10" name="PlaceHolder 2"/>
+          <p:cNvPr id="7" name="PlaceHolder 2"/>
           <p:cNvSpPr>
             <a:spLocks noGrp="1"/>
           </p:cNvSpPr>
@@ -768,7 +767,7 @@
         <p:spPr>
           <a:xfrm>
             <a:off x="504000" y="1326600"/>
-            <a:ext cx="4426920" cy="3288240"/>
+            <a:ext cx="4426920" cy="3288600"/>
           </a:xfrm>
           <a:prstGeom prst="rect">
             <a:avLst/>
@@ -787,7 +786,7 @@
       </p:sp>
       <p:sp>
         <p:nvSpPr>
-          <p:cNvPr id="11" name="PlaceHolder 3"/>
+          <p:cNvPr id="8" name="PlaceHolder 3"/>
           <p:cNvSpPr>
             <a:spLocks noGrp="1"/>
           </p:cNvSpPr>
@@ -798,7 +797,7 @@
         <p:spPr>
           <a:xfrm>
             <a:off x="5152680" y="1326600"/>
-            <a:ext cx="4426920" cy="3288240"/>
+            <a:ext cx="4426920" cy="3288600"/>
           </a:xfrm>
           <a:prstGeom prst="rect">
             <a:avLst/>
@@ -839,7 +838,7 @@
       </p:grpSpPr>
       <p:sp>
         <p:nvSpPr>
-          <p:cNvPr id="12" name="PlaceHolder 1"/>
+          <p:cNvPr id="9" name="PlaceHolder 1"/>
           <p:cNvSpPr>
             <a:spLocks noGrp="1"/>
           </p:cNvSpPr>
@@ -850,7 +849,7 @@
         <p:spPr>
           <a:xfrm>
             <a:off x="504000" y="226080"/>
-            <a:ext cx="9071640" cy="946440"/>
+            <a:ext cx="9071640" cy="946080"/>
           </a:xfrm>
           <a:prstGeom prst="rect">
             <a:avLst/>
@@ -890,7 +889,7 @@
       </p:grpSpPr>
       <p:sp>
         <p:nvSpPr>
-          <p:cNvPr id="13" name="PlaceHolder 1"/>
+          <p:cNvPr id="10" name="PlaceHolder 1"/>
           <p:cNvSpPr>
             <a:spLocks noGrp="1"/>
           </p:cNvSpPr>
@@ -901,7 +900,7 @@
         <p:spPr>
           <a:xfrm>
             <a:off x="504000" y="226080"/>
-            <a:ext cx="9071640" cy="4388400"/>
+            <a:ext cx="9071640" cy="4386600"/>
           </a:xfrm>
           <a:prstGeom prst="rect">
             <a:avLst/>
@@ -941,7 +940,7 @@
       </p:grpSpPr>
       <p:sp>
         <p:nvSpPr>
-          <p:cNvPr id="14" name="PlaceHolder 1"/>
+          <p:cNvPr id="11" name="PlaceHolder 1"/>
           <p:cNvSpPr>
             <a:spLocks noGrp="1"/>
           </p:cNvSpPr>
@@ -952,7 +951,7 @@
         <p:spPr>
           <a:xfrm>
             <a:off x="504000" y="226080"/>
-            <a:ext cx="9071640" cy="946440"/>
+            <a:ext cx="9071640" cy="946080"/>
           </a:xfrm>
           <a:prstGeom prst="rect">
             <a:avLst/>
@@ -970,7 +969,7 @@
       </p:sp>
       <p:sp>
         <p:nvSpPr>
-          <p:cNvPr id="15" name="PlaceHolder 2"/>
+          <p:cNvPr id="12" name="PlaceHolder 2"/>
           <p:cNvSpPr>
             <a:spLocks noGrp="1"/>
           </p:cNvSpPr>
@@ -981,7 +980,7 @@
         <p:spPr>
           <a:xfrm>
             <a:off x="504000" y="1326600"/>
-            <a:ext cx="4426920" cy="1568160"/>
+            <a:ext cx="4426920" cy="1568520"/>
           </a:xfrm>
           <a:prstGeom prst="rect">
             <a:avLst/>
@@ -1000,7 +999,7 @@
       </p:sp>
       <p:sp>
         <p:nvSpPr>
-          <p:cNvPr id="16" name="PlaceHolder 3"/>
+          <p:cNvPr id="13" name="PlaceHolder 3"/>
           <p:cNvSpPr>
             <a:spLocks noGrp="1"/>
           </p:cNvSpPr>
@@ -1011,7 +1010,7 @@
         <p:spPr>
           <a:xfrm>
             <a:off x="5152680" y="1326600"/>
-            <a:ext cx="4426920" cy="3288240"/>
+            <a:ext cx="4426920" cy="3288600"/>
           </a:xfrm>
           <a:prstGeom prst="rect">
             <a:avLst/>
@@ -1030,7 +1029,7 @@
       </p:sp>
       <p:sp>
         <p:nvSpPr>
-          <p:cNvPr id="17" name="PlaceHolder 4"/>
+          <p:cNvPr id="14" name="PlaceHolder 4"/>
           <p:cNvSpPr>
             <a:spLocks noGrp="1"/>
           </p:cNvSpPr>
@@ -1040,8 +1039,8 @@
         </p:nvSpPr>
         <p:spPr>
           <a:xfrm>
-            <a:off x="504000" y="3044160"/>
-            <a:ext cx="4426920" cy="1568160"/>
+            <a:off x="504000" y="3044520"/>
+            <a:ext cx="4426920" cy="1568520"/>
           </a:xfrm>
           <a:prstGeom prst="rect">
             <a:avLst/>
@@ -1082,7 +1081,7 @@
       </p:grpSpPr>
       <p:sp>
         <p:nvSpPr>
-          <p:cNvPr id="18" name="PlaceHolder 1"/>
+          <p:cNvPr id="15" name="PlaceHolder 1"/>
           <p:cNvSpPr>
             <a:spLocks noGrp="1"/>
           </p:cNvSpPr>
@@ -1093,7 +1092,7 @@
         <p:spPr>
           <a:xfrm>
             <a:off x="504000" y="226080"/>
-            <a:ext cx="9071640" cy="946440"/>
+            <a:ext cx="9071640" cy="946080"/>
           </a:xfrm>
           <a:prstGeom prst="rect">
             <a:avLst/>
@@ -1111,7 +1110,7 @@
       </p:sp>
       <p:sp>
         <p:nvSpPr>
-          <p:cNvPr id="19" name="PlaceHolder 2"/>
+          <p:cNvPr id="16" name="PlaceHolder 2"/>
           <p:cNvSpPr>
             <a:spLocks noGrp="1"/>
           </p:cNvSpPr>
@@ -1122,7 +1121,7 @@
         <p:spPr>
           <a:xfrm>
             <a:off x="504000" y="1326600"/>
-            <a:ext cx="4426920" cy="3288240"/>
+            <a:ext cx="4426920" cy="3288600"/>
           </a:xfrm>
           <a:prstGeom prst="rect">
             <a:avLst/>
@@ -1141,7 +1140,7 @@
       </p:sp>
       <p:sp>
         <p:nvSpPr>
-          <p:cNvPr id="20" name="PlaceHolder 3"/>
+          <p:cNvPr id="17" name="PlaceHolder 3"/>
           <p:cNvSpPr>
             <a:spLocks noGrp="1"/>
           </p:cNvSpPr>
@@ -1152,7 +1151,7 @@
         <p:spPr>
           <a:xfrm>
             <a:off x="5152680" y="1326600"/>
-            <a:ext cx="4426920" cy="1568160"/>
+            <a:ext cx="4426920" cy="1568520"/>
           </a:xfrm>
           <a:prstGeom prst="rect">
             <a:avLst/>
@@ -1171,7 +1170,7 @@
       </p:sp>
       <p:sp>
         <p:nvSpPr>
-          <p:cNvPr id="21" name="PlaceHolder 4"/>
+          <p:cNvPr id="18" name="PlaceHolder 4"/>
           <p:cNvSpPr>
             <a:spLocks noGrp="1"/>
           </p:cNvSpPr>
@@ -1181,8 +1180,8 @@
         </p:nvSpPr>
         <p:spPr>
           <a:xfrm>
-            <a:off x="5152680" y="3044160"/>
-            <a:ext cx="4426920" cy="1568160"/>
+            <a:off x="5152680" y="3044520"/>
+            <a:ext cx="4426920" cy="1568520"/>
           </a:xfrm>
           <a:prstGeom prst="rect">
             <a:avLst/>
@@ -1223,7 +1222,7 @@
       </p:grpSpPr>
       <p:sp>
         <p:nvSpPr>
-          <p:cNvPr id="22" name="PlaceHolder 1"/>
+          <p:cNvPr id="19" name="PlaceHolder 1"/>
           <p:cNvSpPr>
             <a:spLocks noGrp="1"/>
           </p:cNvSpPr>
@@ -1234,7 +1233,7 @@
         <p:spPr>
           <a:xfrm>
             <a:off x="504000" y="226080"/>
-            <a:ext cx="9071640" cy="946440"/>
+            <a:ext cx="9071640" cy="946080"/>
           </a:xfrm>
           <a:prstGeom prst="rect">
             <a:avLst/>
@@ -1252,7 +1251,7 @@
       </p:sp>
       <p:sp>
         <p:nvSpPr>
-          <p:cNvPr id="23" name="PlaceHolder 2"/>
+          <p:cNvPr id="20" name="PlaceHolder 2"/>
           <p:cNvSpPr>
             <a:spLocks noGrp="1"/>
           </p:cNvSpPr>
@@ -1263,7 +1262,7 @@
         <p:spPr>
           <a:xfrm>
             <a:off x="504000" y="1326600"/>
-            <a:ext cx="4426920" cy="1568160"/>
+            <a:ext cx="4426920" cy="1568520"/>
           </a:xfrm>
           <a:prstGeom prst="rect">
             <a:avLst/>
@@ -1282,7 +1281,7 @@
       </p:sp>
       <p:sp>
         <p:nvSpPr>
-          <p:cNvPr id="24" name="PlaceHolder 3"/>
+          <p:cNvPr id="21" name="PlaceHolder 3"/>
           <p:cNvSpPr>
             <a:spLocks noGrp="1"/>
           </p:cNvSpPr>
@@ -1293,7 +1292,7 @@
         <p:spPr>
           <a:xfrm>
             <a:off x="5152680" y="1326600"/>
-            <a:ext cx="4426920" cy="1568160"/>
+            <a:ext cx="4426920" cy="1568520"/>
           </a:xfrm>
           <a:prstGeom prst="rect">
             <a:avLst/>
@@ -1312,7 +1311,7 @@
       </p:sp>
       <p:sp>
         <p:nvSpPr>
-          <p:cNvPr id="25" name="PlaceHolder 4"/>
+          <p:cNvPr id="22" name="PlaceHolder 4"/>
           <p:cNvSpPr>
             <a:spLocks noGrp="1"/>
           </p:cNvSpPr>
@@ -1322,8 +1321,8 @@
         </p:nvSpPr>
         <p:spPr>
           <a:xfrm>
-            <a:off x="504000" y="3044160"/>
-            <a:ext cx="9071640" cy="1568160"/>
+            <a:off x="504000" y="3044520"/>
+            <a:ext cx="9072000" cy="1568520"/>
           </a:xfrm>
           <a:prstGeom prst="rect">
             <a:avLst/>
@@ -1375,7 +1374,7 @@
         <p:spPr>
           <a:xfrm>
             <a:off x="504000" y="226080"/>
-            <a:ext cx="9071640" cy="946440"/>
+            <a:ext cx="9071640" cy="946080"/>
           </a:xfrm>
           <a:prstGeom prst="rect">
             <a:avLst/>
@@ -1384,14 +1383,25 @@
         <p:txBody>
           <a:bodyPr lIns="0" rIns="0" tIns="0" bIns="0" anchor="ctr"/>
           <a:p>
-            <a:pPr algn="ctr"/>
-            <a:r>
-              <a:rPr b="0" lang="en-US" sz="4400" spc="-1" strike="noStrike">
-                <a:latin typeface="Arial"/>
-              </a:rPr>
-              <a:t>Click to edit the title text format</a:t>
-            </a:r>
-            <a:endParaRPr b="0" lang="en-US" sz="4400" spc="-1" strike="noStrike">
+            <a:r>
+              <a:rPr b="0" lang="en-US" sz="1800" spc="-1" strike="noStrike">
+                <a:latin typeface="Arial"/>
+              </a:rPr>
+              <a:t>Click to edit </a:t>
+            </a:r>
+            <a:r>
+              <a:rPr b="0" lang="en-US" sz="1800" spc="-1" strike="noStrike">
+                <a:latin typeface="Arial"/>
+              </a:rPr>
+              <a:t>the title text </a:t>
+            </a:r>
+            <a:r>
+              <a:rPr b="0" lang="en-US" sz="1800" spc="-1" strike="noStrike">
+                <a:latin typeface="Arial"/>
+              </a:rPr>
+              <a:t>format</a:t>
+            </a:r>
+            <a:endParaRPr b="0" lang="en-US" sz="1800" spc="-1" strike="noStrike">
               <a:latin typeface="Arial"/>
             </a:endParaRPr>
           </a:p>
@@ -1410,7 +1420,7 @@
         <p:spPr>
           <a:xfrm>
             <a:off x="504000" y="1326600"/>
-            <a:ext cx="9071640" cy="3288240"/>
+            <a:ext cx="9072000" cy="3288600"/>
           </a:xfrm>
           <a:prstGeom prst="rect">
             <a:avLst/>
@@ -1572,110 +1582,6 @@
             </a:r>
             <a:endParaRPr b="0" lang="en-US" sz="2000" spc="-1" strike="noStrike">
               <a:latin typeface="Arial"/>
-            </a:endParaRPr>
-          </a:p>
-        </p:txBody>
-      </p:sp>
-      <p:sp>
-        <p:nvSpPr>
-          <p:cNvPr id="2" name="PlaceHolder 3"/>
-          <p:cNvSpPr>
-            <a:spLocks noGrp="1"/>
-          </p:cNvSpPr>
-          <p:nvPr>
-            <p:ph type="dt"/>
-          </p:nvPr>
-        </p:nvSpPr>
-        <p:spPr>
-          <a:xfrm>
-            <a:off x="504000" y="5165280"/>
-            <a:ext cx="2348280" cy="390600"/>
-          </a:xfrm>
-          <a:prstGeom prst="rect">
-            <a:avLst/>
-          </a:prstGeom>
-        </p:spPr>
-        <p:txBody>
-          <a:bodyPr lIns="0" rIns="0" tIns="0" bIns="0"/>
-          <a:p>
-            <a:r>
-              <a:rPr b="0" lang="en-US" sz="1400" spc="-1" strike="noStrike">
-                <a:latin typeface="Times New Roman"/>
-              </a:rPr>
-              <a:t> </a:t>
-            </a:r>
-            <a:endParaRPr b="0" lang="en-US" sz="1400" spc="-1" strike="noStrike">
-              <a:latin typeface="Times New Roman"/>
-            </a:endParaRPr>
-          </a:p>
-        </p:txBody>
-      </p:sp>
-      <p:sp>
-        <p:nvSpPr>
-          <p:cNvPr id="3" name="PlaceHolder 4"/>
-          <p:cNvSpPr>
-            <a:spLocks noGrp="1"/>
-          </p:cNvSpPr>
-          <p:nvPr>
-            <p:ph type="ftr"/>
-          </p:nvPr>
-        </p:nvSpPr>
-        <p:spPr>
-          <a:xfrm>
-            <a:off x="3447360" y="5165280"/>
-            <a:ext cx="3195000" cy="390600"/>
-          </a:xfrm>
-          <a:prstGeom prst="rect">
-            <a:avLst/>
-          </a:prstGeom>
-        </p:spPr>
-        <p:txBody>
-          <a:bodyPr lIns="0" rIns="0" tIns="0" bIns="0"/>
-          <a:p>
-            <a:pPr algn="ctr"/>
-            <a:r>
-              <a:rPr b="0" lang="en-US" sz="1400" spc="-1" strike="noStrike">
-                <a:latin typeface="Times New Roman"/>
-              </a:rPr>
-              <a:t> </a:t>
-            </a:r>
-            <a:endParaRPr b="0" lang="en-US" sz="1400" spc="-1" strike="noStrike">
-              <a:latin typeface="Times New Roman"/>
-            </a:endParaRPr>
-          </a:p>
-        </p:txBody>
-      </p:sp>
-      <p:sp>
-        <p:nvSpPr>
-          <p:cNvPr id="4" name="PlaceHolder 5"/>
-          <p:cNvSpPr>
-            <a:spLocks noGrp="1"/>
-          </p:cNvSpPr>
-          <p:nvPr>
-            <p:ph type="sldNum"/>
-          </p:nvPr>
-        </p:nvSpPr>
-        <p:spPr>
-          <a:xfrm>
-            <a:off x="7227360" y="5165280"/>
-            <a:ext cx="2348280" cy="390600"/>
-          </a:xfrm>
-          <a:prstGeom prst="rect">
-            <a:avLst/>
-          </a:prstGeom>
-        </p:spPr>
-        <p:txBody>
-          <a:bodyPr lIns="0" rIns="0" tIns="0" bIns="0"/>
-          <a:p>
-            <a:pPr algn="r"/>
-            <a:fld id="{2D99D4A6-D1D2-45CF-A0B1-B3B44A2663EE}" type="slidenum">
-              <a:rPr b="0" lang="en-US" sz="1400" spc="-1" strike="noStrike">
-                <a:latin typeface="Times New Roman"/>
-              </a:rPr>
-              <a:t>1</a:t>
-            </a:fld>
-            <a:endParaRPr b="0" lang="en-US" sz="1400" spc="-1" strike="noStrike">
-              <a:latin typeface="Times New Roman"/>
             </a:endParaRPr>
           </a:p>
         </p:txBody>
@@ -1719,14 +1625,14 @@
       </p:grpSpPr>
       <p:sp>
         <p:nvSpPr>
-          <p:cNvPr id="41" name="CustomShape 1"/>
+          <p:cNvPr id="38" name="CustomShape 1"/>
           <p:cNvSpPr/>
           <p:nvPr/>
         </p:nvSpPr>
         <p:spPr>
           <a:xfrm>
             <a:off x="5569920" y="3787920"/>
-            <a:ext cx="2244240" cy="1551600"/>
+            <a:ext cx="2242800" cy="1550160"/>
           </a:xfrm>
           <a:prstGeom prst="rect">
             <a:avLst/>
@@ -1747,14 +1653,14 @@
       </p:sp>
       <p:sp>
         <p:nvSpPr>
-          <p:cNvPr id="42" name="CustomShape 2"/>
+          <p:cNvPr id="39" name="CustomShape 2"/>
           <p:cNvSpPr/>
           <p:nvPr/>
         </p:nvSpPr>
         <p:spPr>
           <a:xfrm>
             <a:off x="2826720" y="3777480"/>
-            <a:ext cx="2152800" cy="1562040"/>
+            <a:ext cx="2151360" cy="1560600"/>
           </a:xfrm>
           <a:prstGeom prst="rect">
             <a:avLst/>
@@ -1775,14 +1681,14 @@
       </p:sp>
       <p:sp>
         <p:nvSpPr>
-          <p:cNvPr id="43" name="CustomShape 3"/>
-          <p:cNvSpPr/>
-          <p:nvPr/>
-        </p:nvSpPr>
-        <p:spPr>
-          <a:xfrm>
-            <a:off x="1330560" y="396000"/>
-            <a:ext cx="3698640" cy="2566080"/>
+          <p:cNvPr id="40" name="CustomShape 3"/>
+          <p:cNvSpPr/>
+          <p:nvPr/>
+        </p:nvSpPr>
+        <p:spPr>
+          <a:xfrm>
+            <a:off x="1330560" y="731520"/>
+            <a:ext cx="3697200" cy="2229120"/>
           </a:xfrm>
           <a:prstGeom prst="rect">
             <a:avLst/>
@@ -1803,14 +1709,14 @@
       </p:sp>
       <p:sp>
         <p:nvSpPr>
-          <p:cNvPr id="44" name="TextShape 4"/>
-          <p:cNvSpPr txBox="1"/>
-          <p:nvPr/>
-        </p:nvSpPr>
-        <p:spPr>
-          <a:xfrm>
-            <a:off x="1458000" y="285120"/>
-            <a:ext cx="1393920" cy="238320"/>
+          <p:cNvPr id="41" name="CustomShape 4"/>
+          <p:cNvSpPr/>
+          <p:nvPr/>
+        </p:nvSpPr>
+        <p:spPr>
+          <a:xfrm>
+            <a:off x="1463040" y="622080"/>
+            <a:ext cx="1392480" cy="236880"/>
           </a:xfrm>
           <a:prstGeom prst="rect">
             <a:avLst/>
@@ -1824,13 +1730,27 @@
             </a:solidFill>
           </a:ln>
         </p:spPr>
+        <p:style>
+          <a:lnRef idx="0"/>
+          <a:fillRef idx="0"/>
+          <a:effectRef idx="0"/>
+          <a:fontRef idx="minor"/>
+        </p:style>
         <p:txBody>
           <a:bodyPr lIns="90000" rIns="90000" tIns="45000" bIns="45000"/>
           <a:p>
-            <a:pPr algn="ctr"/>
+            <a:pPr algn="ctr">
+              <a:lnSpc>
+                <a:spcPct val="100000"/>
+              </a:lnSpc>
+            </a:pPr>
             <a:r>
               <a:rPr b="0" lang="en-US" sz="1050" spc="-1" strike="noStrike">
-                <a:latin typeface="Arial"/>
+                <a:solidFill>
+                  <a:srgbClr val="000000"/>
+                </a:solidFill>
+                <a:latin typeface="Arial"/>
+                <a:ea typeface="DejaVu Sans"/>
               </a:rPr>
               <a:t>timer (proc1, HW-A)</a:t>
             </a:r>
@@ -1842,14 +1762,14 @@
       </p:sp>
       <p:sp>
         <p:nvSpPr>
-          <p:cNvPr id="45" name="TextShape 5"/>
-          <p:cNvSpPr txBox="1"/>
+          <p:cNvPr id="42" name="CustomShape 5"/>
+          <p:cNvSpPr/>
           <p:nvPr/>
         </p:nvSpPr>
         <p:spPr>
           <a:xfrm>
             <a:off x="6104160" y="310320"/>
-            <a:ext cx="1393920" cy="554760"/>
+            <a:ext cx="1392480" cy="553320"/>
           </a:xfrm>
           <a:prstGeom prst="rect">
             <a:avLst/>
@@ -1863,12 +1783,27 @@
             </a:solidFill>
           </a:ln>
         </p:spPr>
+        <p:style>
+          <a:lnRef idx="0"/>
+          <a:fillRef idx="0"/>
+          <a:effectRef idx="0"/>
+          <a:fontRef idx="minor"/>
+        </p:style>
         <p:txBody>
           <a:bodyPr lIns="90000" rIns="90000" tIns="45000" bIns="45000" anchor="ctr"/>
           <a:p>
+            <a:pPr>
+              <a:lnSpc>
+                <a:spcPct val="100000"/>
+              </a:lnSpc>
+            </a:pPr>
             <a:r>
               <a:rPr b="0" lang="en-US" sz="1050" spc="-1" strike="noStrike">
-                <a:latin typeface="Arial"/>
+                <a:solidFill>
+                  <a:srgbClr val="000000"/>
+                </a:solidFill>
+                <a:latin typeface="Arial"/>
+                <a:ea typeface="DejaVu Sans"/>
               </a:rPr>
               <a:t>Real Physical Robot</a:t>
             </a:r>
@@ -1880,14 +1815,14 @@
       </p:sp>
       <p:sp>
         <p:nvSpPr>
-          <p:cNvPr id="46" name="TextShape 6"/>
-          <p:cNvSpPr txBox="1"/>
+          <p:cNvPr id="43" name="CustomShape 6"/>
+          <p:cNvSpPr/>
           <p:nvPr/>
         </p:nvSpPr>
         <p:spPr>
           <a:xfrm>
             <a:off x="8298720" y="310320"/>
-            <a:ext cx="1393920" cy="548640"/>
+            <a:ext cx="1392480" cy="547200"/>
           </a:xfrm>
           <a:prstGeom prst="rect">
             <a:avLst/>
@@ -1901,13 +1836,27 @@
             </a:solidFill>
           </a:ln>
         </p:spPr>
+        <p:style>
+          <a:lnRef idx="0"/>
+          <a:fillRef idx="0"/>
+          <a:effectRef idx="0"/>
+          <a:fontRef idx="minor"/>
+        </p:style>
         <p:txBody>
           <a:bodyPr lIns="90000" rIns="90000" tIns="45000" bIns="45000" anchor="ctr"/>
           <a:p>
-            <a:pPr algn="ctr"/>
+            <a:pPr algn="ctr">
+              <a:lnSpc>
+                <a:spcPct val="100000"/>
+              </a:lnSpc>
+            </a:pPr>
             <a:r>
               <a:rPr b="0" lang="en-US" sz="1050" spc="-1" strike="noStrike">
-                <a:latin typeface="Arial"/>
+                <a:solidFill>
+                  <a:srgbClr val="000000"/>
+                </a:solidFill>
+                <a:latin typeface="Arial"/>
+                <a:ea typeface="DejaVu Sans"/>
               </a:rPr>
               <a:t>Robot Simulation</a:t>
             </a:r>
@@ -1919,14 +1868,14 @@
       </p:sp>
       <p:sp>
         <p:nvSpPr>
-          <p:cNvPr id="47" name="TextShape 7"/>
-          <p:cNvSpPr txBox="1"/>
+          <p:cNvPr id="44" name="CustomShape 7"/>
+          <p:cNvSpPr/>
           <p:nvPr/>
         </p:nvSpPr>
         <p:spPr>
           <a:xfrm>
             <a:off x="1097280" y="3236400"/>
-            <a:ext cx="1188720" cy="512640"/>
+            <a:ext cx="1187280" cy="511200"/>
           </a:xfrm>
           <a:prstGeom prst="rect">
             <a:avLst/>
@@ -1938,13 +1887,27 @@
             <a:noFill/>
           </a:ln>
         </p:spPr>
+        <p:style>
+          <a:lnRef idx="0"/>
+          <a:fillRef idx="0"/>
+          <a:effectRef idx="0"/>
+          <a:fontRef idx="minor"/>
+        </p:style>
         <p:txBody>
           <a:bodyPr lIns="90000" rIns="90000" tIns="45000" bIns="45000" anchor="ctr"/>
           <a:p>
-            <a:pPr algn="ctr"/>
+            <a:pPr algn="ctr">
+              <a:lnSpc>
+                <a:spcPct val="100000"/>
+              </a:lnSpc>
+            </a:pPr>
             <a:r>
               <a:rPr b="0" lang="en-US" sz="1050" spc="-1" strike="noStrike">
-                <a:latin typeface="Arial"/>
+                <a:solidFill>
+                  <a:srgbClr val="000000"/>
+                </a:solidFill>
+                <a:latin typeface="Arial"/>
+                <a:ea typeface="DejaVu Sans"/>
               </a:rPr>
               <a:t>Shared memory</a:t>
             </a:r>
@@ -1956,14 +1919,14 @@
       </p:sp>
       <p:sp>
         <p:nvSpPr>
-          <p:cNvPr id="48" name="TextShape 8"/>
-          <p:cNvSpPr txBox="1"/>
+          <p:cNvPr id="45" name="CustomShape 8"/>
+          <p:cNvSpPr/>
           <p:nvPr/>
         </p:nvSpPr>
         <p:spPr>
           <a:xfrm>
             <a:off x="2967840" y="3605040"/>
-            <a:ext cx="1280160" cy="386280"/>
+            <a:ext cx="1278720" cy="384840"/>
           </a:xfrm>
           <a:prstGeom prst="rect">
             <a:avLst/>
@@ -1977,13 +1940,27 @@
             </a:solidFill>
           </a:ln>
         </p:spPr>
+        <p:style>
+          <a:lnRef idx="0"/>
+          <a:fillRef idx="0"/>
+          <a:effectRef idx="0"/>
+          <a:fontRef idx="minor"/>
+        </p:style>
         <p:txBody>
           <a:bodyPr lIns="90000" rIns="90000" tIns="45000" bIns="45000"/>
           <a:p>
-            <a:pPr algn="ctr"/>
+            <a:pPr algn="ctr">
+              <a:lnSpc>
+                <a:spcPct val="100000"/>
+              </a:lnSpc>
+            </a:pPr>
             <a:r>
               <a:rPr b="0" lang="en-US" sz="1050" spc="-1" strike="noStrike">
-                <a:latin typeface="Arial"/>
+                <a:solidFill>
+                  <a:srgbClr val="000000"/>
+                </a:solidFill>
+                <a:latin typeface="Arial"/>
+                <a:ea typeface="DejaVu Sans"/>
               </a:rPr>
               <a:t>operation_server</a:t>
             </a:r>
@@ -1992,10 +1969,18 @@
             </a:endParaRPr>
           </a:p>
           <a:p>
-            <a:pPr algn="ctr"/>
+            <a:pPr algn="ctr">
+              <a:lnSpc>
+                <a:spcPct val="100000"/>
+              </a:lnSpc>
+            </a:pPr>
             <a:r>
               <a:rPr b="0" lang="en-US" sz="1050" spc="-1" strike="noStrike">
-                <a:latin typeface="Arial"/>
+                <a:solidFill>
+                  <a:srgbClr val="000000"/>
+                </a:solidFill>
+                <a:latin typeface="Arial"/>
+                <a:ea typeface="DejaVu Sans"/>
               </a:rPr>
               <a:t>(proc2, HW-A)</a:t>
             </a:r>
@@ -2007,14 +1992,14 @@
       </p:sp>
       <p:sp>
         <p:nvSpPr>
-          <p:cNvPr id="49" name="CustomShape 9"/>
-          <p:cNvSpPr/>
-          <p:nvPr/>
-        </p:nvSpPr>
-        <p:spPr>
-          <a:xfrm>
-            <a:off x="270720" y="1833120"/>
-            <a:ext cx="822960" cy="457200"/>
+          <p:cNvPr id="46" name="CustomShape 9"/>
+          <p:cNvSpPr/>
+          <p:nvPr/>
+        </p:nvSpPr>
+        <p:spPr>
+          <a:xfrm>
+            <a:off x="270720" y="1581120"/>
+            <a:ext cx="821520" cy="455760"/>
           </a:xfrm>
           <a:prstGeom prst="can">
             <a:avLst>
@@ -2039,14 +2024,14 @@
       </p:sp>
       <p:sp>
         <p:nvSpPr>
-          <p:cNvPr id="50" name="TextShape 10"/>
-          <p:cNvSpPr txBox="1"/>
-          <p:nvPr/>
-        </p:nvSpPr>
-        <p:spPr>
-          <a:xfrm>
-            <a:off x="204480" y="1888560"/>
-            <a:ext cx="964800" cy="421560"/>
+          <p:cNvPr id="47" name="CustomShape 10"/>
+          <p:cNvSpPr/>
+          <p:nvPr/>
+        </p:nvSpPr>
+        <p:spPr>
+          <a:xfrm>
+            <a:off x="204480" y="1636560"/>
+            <a:ext cx="963360" cy="420120"/>
           </a:xfrm>
           <a:prstGeom prst="rect">
             <a:avLst/>
@@ -2056,13 +2041,27 @@
             <a:noFill/>
           </a:ln>
         </p:spPr>
+        <p:style>
+          <a:lnRef idx="0"/>
+          <a:fillRef idx="0"/>
+          <a:effectRef idx="0"/>
+          <a:fontRef idx="minor"/>
+        </p:style>
         <p:txBody>
           <a:bodyPr lIns="90000" rIns="90000" tIns="45000" bIns="45000"/>
           <a:p>
-            <a:pPr algn="ctr"/>
+            <a:pPr algn="ctr">
+              <a:lnSpc>
+                <a:spcPct val="100000"/>
+              </a:lnSpc>
+            </a:pPr>
             <a:r>
               <a:rPr b="0" lang="en-US" sz="1050" spc="-1" strike="noStrike">
-                <a:latin typeface="Arial"/>
+                <a:solidFill>
+                  <a:srgbClr val="000000"/>
+                </a:solidFill>
+                <a:latin typeface="Arial"/>
+                <a:ea typeface="DejaVu Sans"/>
               </a:rPr>
               <a:t>robot def.</a:t>
             </a:r>
@@ -2071,10 +2070,18 @@
             </a:endParaRPr>
           </a:p>
           <a:p>
-            <a:pPr algn="ctr"/>
+            <a:pPr algn="ctr">
+              <a:lnSpc>
+                <a:spcPct val="100000"/>
+              </a:lnSpc>
+            </a:pPr>
             <a:r>
               <a:rPr b="0" lang="en-US" sz="1050" spc="-1" strike="noStrike">
-                <a:latin typeface="Arial"/>
+                <a:solidFill>
+                  <a:srgbClr val="000000"/>
+                </a:solidFill>
+                <a:latin typeface="Arial"/>
+                <a:ea typeface="DejaVu Sans"/>
               </a:rPr>
               <a:t>(yaml or db)</a:t>
             </a:r>
@@ -2086,14 +2093,14 @@
       </p:sp>
       <p:sp>
         <p:nvSpPr>
-          <p:cNvPr id="51" name="CustomShape 11"/>
+          <p:cNvPr id="48" name="CustomShape 11"/>
           <p:cNvSpPr/>
           <p:nvPr/>
         </p:nvSpPr>
         <p:spPr>
           <a:xfrm>
             <a:off x="258480" y="2379240"/>
-            <a:ext cx="822960" cy="457200"/>
+            <a:ext cx="821520" cy="455760"/>
           </a:xfrm>
           <a:prstGeom prst="can">
             <a:avLst>
@@ -2118,14 +2125,14 @@
       </p:sp>
       <p:sp>
         <p:nvSpPr>
-          <p:cNvPr id="52" name="TextShape 12"/>
-          <p:cNvSpPr txBox="1"/>
+          <p:cNvPr id="49" name="CustomShape 12"/>
+          <p:cNvSpPr/>
           <p:nvPr/>
         </p:nvSpPr>
         <p:spPr>
           <a:xfrm>
             <a:off x="192240" y="2434680"/>
-            <a:ext cx="964800" cy="421560"/>
+            <a:ext cx="963360" cy="420120"/>
           </a:xfrm>
           <a:prstGeom prst="rect">
             <a:avLst/>
@@ -2135,39 +2142,100 @@
             <a:noFill/>
           </a:ln>
         </p:spPr>
+        <p:style>
+          <a:lnRef idx="0"/>
+          <a:fillRef idx="0"/>
+          <a:effectRef idx="0"/>
+          <a:fontRef idx="minor"/>
+        </p:style>
         <p:txBody>
           <a:bodyPr lIns="90000" rIns="90000" tIns="45000" bIns="45000"/>
           <a:p>
-            <a:pPr algn="ctr"/>
+            <a:pPr algn="ctr">
+              <a:lnSpc>
+                <a:spcPct val="100000"/>
+              </a:lnSpc>
+            </a:pPr>
             <a:r>
               <a:rPr b="0" lang="en-US" sz="1050" spc="-1" strike="noStrike">
-                <a:latin typeface="Arial"/>
-              </a:rPr>
-              <a:t>ctrl </a:t>
-            </a:r>
+                <a:solidFill>
+                  <a:srgbClr val="000000"/>
+                </a:solidFill>
+                <a:latin typeface="Arial"/>
+                <a:ea typeface="DejaVu Sans"/>
+              </a:rPr>
+              <a:t>ctrl param</a:t>
+            </a:r>
+            <a:endParaRPr b="0" lang="en-US" sz="1050" spc="-1" strike="noStrike">
+              <a:latin typeface="Arial"/>
+            </a:endParaRPr>
+          </a:p>
+          <a:p>
+            <a:pPr algn="ctr">
+              <a:lnSpc>
+                <a:spcPct val="100000"/>
+              </a:lnSpc>
+            </a:pPr>
             <a:r>
               <a:rPr b="0" lang="en-US" sz="1050" spc="-1" strike="noStrike">
-                <a:latin typeface="Arial"/>
-              </a:rPr>
-              <a:t>param</a:t>
+                <a:solidFill>
+                  <a:srgbClr val="000000"/>
+                </a:solidFill>
+                <a:latin typeface="Arial"/>
+                <a:ea typeface="DejaVu Sans"/>
+              </a:rPr>
+              <a:t>(yaml or db)</a:t>
             </a:r>
             <a:endParaRPr b="0" lang="en-US" sz="1050" spc="-1" strike="noStrike">
               <a:latin typeface="Arial"/>
             </a:endParaRPr>
           </a:p>
-          <a:p>
-            <a:pPr algn="ctr"/>
+        </p:txBody>
+      </p:sp>
+      <p:sp>
+        <p:nvSpPr>
+          <p:cNvPr id="50" name="CustomShape 13"/>
+          <p:cNvSpPr/>
+          <p:nvPr/>
+        </p:nvSpPr>
+        <p:spPr>
+          <a:xfrm>
+            <a:off x="2468880" y="1737360"/>
+            <a:ext cx="1461600" cy="237240"/>
+          </a:xfrm>
+          <a:prstGeom prst="rect">
+            <a:avLst/>
+          </a:prstGeom>
+          <a:noFill/>
+          <a:ln>
+            <a:solidFill>
+              <a:srgbClr val="3465a4"/>
+            </a:solidFill>
+          </a:ln>
+        </p:spPr>
+        <p:style>
+          <a:lnRef idx="0"/>
+          <a:fillRef idx="0"/>
+          <a:effectRef idx="0"/>
+          <a:fontRef idx="minor"/>
+        </p:style>
+        <p:txBody>
+          <a:bodyPr lIns="90000" rIns="90000" tIns="45000" bIns="45000"/>
+          <a:p>
+            <a:pPr algn="ctr">
+              <a:lnSpc>
+                <a:spcPct val="100000"/>
+              </a:lnSpc>
+            </a:pPr>
             <a:r>
               <a:rPr b="0" lang="en-US" sz="1050" spc="-1" strike="noStrike">
-                <a:latin typeface="Arial"/>
-              </a:rPr>
-              <a:t>(yaml or </a:t>
-            </a:r>
-            <a:r>
-              <a:rPr b="0" lang="en-US" sz="1050" spc="-1" strike="noStrike">
-                <a:latin typeface="Arial"/>
-              </a:rPr>
-              <a:t>db)</a:t>
+                <a:solidFill>
+                  <a:srgbClr val="000000"/>
+                </a:solidFill>
+                <a:latin typeface="Arial"/>
+                <a:ea typeface="DejaVu Sans"/>
+              </a:rPr>
+              <a:t>parser</a:t>
             </a:r>
             <a:endParaRPr b="0" lang="en-US" sz="1050" spc="-1" strike="noStrike">
               <a:latin typeface="Arial"/>
@@ -2177,51 +2245,14 @@
       </p:sp>
       <p:sp>
         <p:nvSpPr>
-          <p:cNvPr id="53" name="TextShape 13"/>
-          <p:cNvSpPr txBox="1"/>
-          <p:nvPr/>
-        </p:nvSpPr>
-        <p:spPr>
-          <a:xfrm>
-            <a:off x="2336400" y="676080"/>
-            <a:ext cx="1463040" cy="238680"/>
-          </a:xfrm>
-          <a:prstGeom prst="rect">
-            <a:avLst/>
-          </a:prstGeom>
-          <a:noFill/>
-          <a:ln>
-            <a:solidFill>
-              <a:srgbClr val="3465a4"/>
-            </a:solidFill>
-          </a:ln>
-        </p:spPr>
-        <p:txBody>
-          <a:bodyPr lIns="90000" rIns="90000" tIns="45000" bIns="45000"/>
-          <a:p>
-            <a:pPr algn="ctr"/>
-            <a:r>
-              <a:rPr b="0" lang="en-US" sz="1050" spc="-1" strike="noStrike">
-                <a:latin typeface="Arial"/>
-              </a:rPr>
-              <a:t>parserre</a:t>
-            </a:r>
-            <a:endParaRPr b="0" lang="en-US" sz="1050" spc="-1" strike="noStrike">
-              <a:latin typeface="Arial"/>
-            </a:endParaRPr>
-          </a:p>
-        </p:txBody>
-      </p:sp>
-      <p:sp>
-        <p:nvSpPr>
-          <p:cNvPr id="54" name="TextShape 14"/>
-          <p:cNvSpPr txBox="1"/>
-          <p:nvPr/>
-        </p:nvSpPr>
-        <p:spPr>
-          <a:xfrm>
-            <a:off x="1768320" y="1814400"/>
-            <a:ext cx="2834640" cy="952560"/>
+          <p:cNvPr id="51" name="CustomShape 14"/>
+          <p:cNvSpPr/>
+          <p:nvPr/>
+        </p:nvSpPr>
+        <p:spPr>
+          <a:xfrm>
+            <a:off x="1768320" y="1463040"/>
+            <a:ext cx="2833200" cy="1302480"/>
           </a:xfrm>
           <a:prstGeom prst="rect">
             <a:avLst/>
@@ -2234,32 +2265,46 @@
             <a:round/>
           </a:ln>
         </p:spPr>
+        <p:style>
+          <a:lnRef idx="0"/>
+          <a:fillRef idx="0"/>
+          <a:effectRef idx="0"/>
+          <a:fontRef idx="minor"/>
+        </p:style>
         <p:txBody>
           <a:bodyPr lIns="109080" rIns="109080" tIns="64080" bIns="64080"/>
           <a:p>
-            <a:pPr algn="ctr"/>
+            <a:pPr algn="ctr">
+              <a:lnSpc>
+                <a:spcPct val="100000"/>
+              </a:lnSpc>
+            </a:pPr>
             <a:r>
               <a:rPr b="1" lang="en-US" sz="1050" spc="-1" strike="noStrike">
-                <a:latin typeface="Arial"/>
+                <a:solidFill>
+                  <a:srgbClr val="000000"/>
+                </a:solidFill>
+                <a:latin typeface="Arial"/>
+                <a:ea typeface="DejaVu Sans"/>
               </a:rPr>
               <a:t>wbc2</a:t>
             </a:r>
-            <a:endParaRPr b="1" lang="en-US" sz="1050" spc="-1" strike="noStrike">
-              <a:latin typeface="Arial"/>
-            </a:endParaRPr>
-          </a:p>
-        </p:txBody>
-      </p:sp>
-      <p:sp>
-        <p:nvSpPr>
-          <p:cNvPr id="55" name="TextShape 15"/>
-          <p:cNvSpPr txBox="1"/>
+            <a:endParaRPr b="0" lang="en-US" sz="1050" spc="-1" strike="noStrike">
+              <a:latin typeface="Arial"/>
+            </a:endParaRPr>
+          </a:p>
+        </p:txBody>
+      </p:sp>
+      <p:sp>
+        <p:nvSpPr>
+          <p:cNvPr id="52" name="CustomShape 15"/>
+          <p:cNvSpPr/>
           <p:nvPr/>
         </p:nvSpPr>
         <p:spPr>
           <a:xfrm>
             <a:off x="1859760" y="2032920"/>
-            <a:ext cx="1280160" cy="238680"/>
+            <a:ext cx="1278720" cy="237240"/>
           </a:xfrm>
           <a:prstGeom prst="rect">
             <a:avLst/>
@@ -2271,13 +2316,27 @@
             </a:solidFill>
           </a:ln>
         </p:spPr>
+        <p:style>
+          <a:lnRef idx="0"/>
+          <a:fillRef idx="0"/>
+          <a:effectRef idx="0"/>
+          <a:fontRef idx="minor"/>
+        </p:style>
         <p:txBody>
           <a:bodyPr lIns="90000" rIns="90000" tIns="45000" bIns="45000"/>
           <a:p>
-            <a:pPr algn="ctr"/>
+            <a:pPr algn="ctr">
+              <a:lnSpc>
+                <a:spcPct val="100000"/>
+              </a:lnSpc>
+            </a:pPr>
             <a:r>
               <a:rPr b="0" lang="en-US" sz="1050" spc="-1" strike="noStrike">
-                <a:latin typeface="Arial"/>
+                <a:solidFill>
+                  <a:srgbClr val="000000"/>
+                </a:solidFill>
+                <a:latin typeface="Arial"/>
+                <a:ea typeface="DejaVu Sans"/>
               </a:rPr>
               <a:t>robot</a:t>
             </a:r>
@@ -2289,14 +2348,14 @@
       </p:sp>
       <p:sp>
         <p:nvSpPr>
-          <p:cNvPr id="56" name="TextShape 16"/>
-          <p:cNvSpPr txBox="1"/>
+          <p:cNvPr id="53" name="CustomShape 16"/>
+          <p:cNvSpPr/>
           <p:nvPr/>
         </p:nvSpPr>
         <p:spPr>
           <a:xfrm>
             <a:off x="1868040" y="2389680"/>
-            <a:ext cx="1280160" cy="238680"/>
+            <a:ext cx="1278720" cy="237240"/>
           </a:xfrm>
           <a:prstGeom prst="rect">
             <a:avLst/>
@@ -2308,13 +2367,27 @@
             </a:solidFill>
           </a:ln>
         </p:spPr>
+        <p:style>
+          <a:lnRef idx="0"/>
+          <a:fillRef idx="0"/>
+          <a:effectRef idx="0"/>
+          <a:fontRef idx="minor"/>
+        </p:style>
         <p:txBody>
           <a:bodyPr lIns="90000" rIns="90000" tIns="45000" bIns="45000"/>
           <a:p>
-            <a:pPr algn="ctr"/>
+            <a:pPr algn="ctr">
+              <a:lnSpc>
+                <a:spcPct val="100000"/>
+              </a:lnSpc>
+            </a:pPr>
             <a:r>
               <a:rPr b="0" lang="en-US" sz="1050" spc="-1" strike="noStrike">
-                <a:latin typeface="Arial"/>
+                <a:solidFill>
+                  <a:srgbClr val="000000"/>
+                </a:solidFill>
+                <a:latin typeface="Arial"/>
+                <a:ea typeface="DejaVu Sans"/>
               </a:rPr>
               <a:t>ctrl_params</a:t>
             </a:r>
@@ -2326,14 +2399,14 @@
       </p:sp>
       <p:sp>
         <p:nvSpPr>
-          <p:cNvPr id="57" name="TextShape 17"/>
-          <p:cNvSpPr txBox="1"/>
+          <p:cNvPr id="54" name="CustomShape 17"/>
+          <p:cNvSpPr/>
           <p:nvPr/>
         </p:nvSpPr>
         <p:spPr>
           <a:xfrm>
             <a:off x="3231360" y="2398680"/>
-            <a:ext cx="1280160" cy="238680"/>
+            <a:ext cx="1278720" cy="237240"/>
           </a:xfrm>
           <a:prstGeom prst="rect">
             <a:avLst/>
@@ -2345,13 +2418,27 @@
             </a:solidFill>
           </a:ln>
         </p:spPr>
+        <p:style>
+          <a:lnRef idx="0"/>
+          <a:fillRef idx="0"/>
+          <a:effectRef idx="0"/>
+          <a:fontRef idx="minor"/>
+        </p:style>
         <p:txBody>
           <a:bodyPr lIns="90000" rIns="90000" tIns="45000" bIns="45000"/>
           <a:p>
-            <a:pPr algn="ctr"/>
+            <a:pPr algn="ctr">
+              <a:lnSpc>
+                <a:spcPct val="100000"/>
+              </a:lnSpc>
+            </a:pPr>
             <a:r>
               <a:rPr b="0" lang="en-US" sz="1050" spc="-1" strike="noStrike">
-                <a:latin typeface="Arial"/>
+                <a:solidFill>
+                  <a:srgbClr val="000000"/>
+                </a:solidFill>
+                <a:latin typeface="Arial"/>
+                <a:ea typeface="DejaVu Sans"/>
               </a:rPr>
               <a:t>xref</a:t>
             </a:r>
@@ -2363,14 +2450,14 @@
       </p:sp>
       <p:sp>
         <p:nvSpPr>
-          <p:cNvPr id="58" name="TextShape 18"/>
-          <p:cNvSpPr txBox="1"/>
-          <p:nvPr/>
-        </p:nvSpPr>
-        <p:spPr>
-          <a:xfrm>
-            <a:off x="1585440" y="1484280"/>
-            <a:ext cx="3200400" cy="1427400"/>
+          <p:cNvPr id="55" name="CustomShape 18"/>
+          <p:cNvSpPr/>
+          <p:nvPr/>
+        </p:nvSpPr>
+        <p:spPr>
+          <a:xfrm>
+            <a:off x="1585440" y="1188720"/>
+            <a:ext cx="3198960" cy="1721520"/>
           </a:xfrm>
           <a:prstGeom prst="rect">
             <a:avLst/>
@@ -2382,13 +2469,27 @@
             </a:solidFill>
           </a:ln>
         </p:spPr>
+        <p:style>
+          <a:lnRef idx="0"/>
+          <a:fillRef idx="0"/>
+          <a:effectRef idx="0"/>
+          <a:fontRef idx="minor"/>
+        </p:style>
         <p:txBody>
           <a:bodyPr lIns="90000" rIns="90000" tIns="45000" bIns="45000"/>
           <a:p>
-            <a:pPr algn="ctr"/>
+            <a:pPr algn="ctr">
+              <a:lnSpc>
+                <a:spcPct val="100000"/>
+              </a:lnSpc>
+            </a:pPr>
             <a:r>
               <a:rPr b="0" lang="en-US" sz="1050" spc="-1" strike="noStrike">
-                <a:latin typeface="Arial"/>
+                <a:solidFill>
+                  <a:srgbClr val="000000"/>
+                </a:solidFill>
+                <a:latin typeface="Arial"/>
+                <a:ea typeface="DejaVu Sans"/>
               </a:rPr>
               <a:t>timer_event (~1kHz)</a:t>
             </a:r>
@@ -2400,14 +2501,14 @@
       </p:sp>
       <p:sp>
         <p:nvSpPr>
-          <p:cNvPr id="59" name="TextShape 19"/>
-          <p:cNvSpPr txBox="1"/>
+          <p:cNvPr id="56" name="CustomShape 19"/>
+          <p:cNvSpPr/>
           <p:nvPr/>
         </p:nvSpPr>
         <p:spPr>
           <a:xfrm>
             <a:off x="3231360" y="2032920"/>
-            <a:ext cx="1280160" cy="238680"/>
+            <a:ext cx="1278720" cy="237240"/>
           </a:xfrm>
           <a:prstGeom prst="rect">
             <a:avLst/>
@@ -2419,13 +2520,27 @@
             </a:solidFill>
           </a:ln>
         </p:spPr>
+        <p:style>
+          <a:lnRef idx="0"/>
+          <a:fillRef idx="0"/>
+          <a:effectRef idx="0"/>
+          <a:fontRef idx="minor"/>
+        </p:style>
         <p:txBody>
           <a:bodyPr lIns="90000" rIns="90000" tIns="45000" bIns="45000"/>
           <a:p>
-            <a:pPr algn="ctr"/>
+            <a:pPr algn="ctr">
+              <a:lnSpc>
+                <a:spcPct val="100000"/>
+              </a:lnSpc>
+            </a:pPr>
             <a:r>
               <a:rPr b="0" lang="en-US" sz="1050" spc="-1" strike="noStrike">
-                <a:latin typeface="Arial"/>
+                <a:solidFill>
+                  <a:srgbClr val="000000"/>
+                </a:solidFill>
+                <a:latin typeface="Arial"/>
+                <a:ea typeface="DejaVu Sans"/>
               </a:rPr>
               <a:t>controller</a:t>
             </a:r>
@@ -2437,14 +2552,14 @@
       </p:sp>
       <p:sp>
         <p:nvSpPr>
-          <p:cNvPr id="60" name="TextShape 20"/>
-          <p:cNvSpPr txBox="1"/>
+          <p:cNvPr id="57" name="CustomShape 20"/>
+          <p:cNvSpPr/>
           <p:nvPr/>
         </p:nvSpPr>
         <p:spPr>
           <a:xfrm>
             <a:off x="3150720" y="4185000"/>
-            <a:ext cx="1463040" cy="238680"/>
+            <a:ext cx="1461600" cy="237240"/>
           </a:xfrm>
           <a:prstGeom prst="rect">
             <a:avLst/>
@@ -2456,13 +2571,27 @@
             </a:solidFill>
           </a:ln>
         </p:spPr>
+        <p:style>
+          <a:lnRef idx="0"/>
+          <a:fillRef idx="0"/>
+          <a:effectRef idx="0"/>
+          <a:fontRef idx="minor"/>
+        </p:style>
         <p:txBody>
           <a:bodyPr lIns="90000" rIns="90000" tIns="45000" bIns="45000"/>
           <a:p>
-            <a:pPr algn="ctr"/>
+            <a:pPr algn="ctr">
+              <a:lnSpc>
+                <a:spcPct val="100000"/>
+              </a:lnSpc>
+            </a:pPr>
             <a:r>
               <a:rPr b="0" lang="en-US" sz="1050" spc="-1" strike="noStrike">
-                <a:latin typeface="Arial"/>
+                <a:solidFill>
+                  <a:srgbClr val="000000"/>
+                </a:solidFill>
+                <a:latin typeface="Arial"/>
+                <a:ea typeface="DejaVu Sans"/>
               </a:rPr>
               <a:t>ctrl_param_callback</a:t>
             </a:r>
@@ -2474,14 +2603,14 @@
       </p:sp>
       <p:sp>
         <p:nvSpPr>
-          <p:cNvPr id="61" name="TextShape 21"/>
-          <p:cNvSpPr txBox="1"/>
+          <p:cNvPr id="58" name="CustomShape 21"/>
+          <p:cNvSpPr/>
           <p:nvPr/>
         </p:nvSpPr>
         <p:spPr>
           <a:xfrm>
             <a:off x="3150720" y="4545000"/>
-            <a:ext cx="1463040" cy="238680"/>
+            <a:ext cx="1461600" cy="237240"/>
           </a:xfrm>
           <a:prstGeom prst="rect">
             <a:avLst/>
@@ -2493,13 +2622,27 @@
             </a:solidFill>
           </a:ln>
         </p:spPr>
+        <p:style>
+          <a:lnRef idx="0"/>
+          <a:fillRef idx="0"/>
+          <a:effectRef idx="0"/>
+          <a:fontRef idx="minor"/>
+        </p:style>
         <p:txBody>
           <a:bodyPr lIns="90000" rIns="90000" tIns="45000" bIns="45000"/>
           <a:p>
-            <a:pPr algn="ctr"/>
+            <a:pPr algn="ctr">
+              <a:lnSpc>
+                <a:spcPct val="100000"/>
+              </a:lnSpc>
+            </a:pPr>
             <a:r>
               <a:rPr b="0" lang="en-US" sz="1050" spc="-1" strike="noStrike">
-                <a:latin typeface="Arial"/>
+                <a:solidFill>
+                  <a:srgbClr val="000000"/>
+                </a:solidFill>
+                <a:latin typeface="Arial"/>
+                <a:ea typeface="DejaVu Sans"/>
               </a:rPr>
               <a:t>xref_callback</a:t>
             </a:r>
@@ -2511,14 +2654,14 @@
       </p:sp>
       <p:sp>
         <p:nvSpPr>
-          <p:cNvPr id="62" name="TextShape 22"/>
-          <p:cNvSpPr txBox="1"/>
-          <p:nvPr/>
-        </p:nvSpPr>
-        <p:spPr>
-          <a:xfrm>
-            <a:off x="2341440" y="1077840"/>
-            <a:ext cx="1463040" cy="238680"/>
+          <p:cNvPr id="59" name="CustomShape 22"/>
+          <p:cNvSpPr/>
+          <p:nvPr/>
+        </p:nvSpPr>
+        <p:spPr>
+          <a:xfrm>
+            <a:off x="2336400" y="913320"/>
+            <a:ext cx="1461600" cy="237240"/>
           </a:xfrm>
           <a:prstGeom prst="rect">
             <a:avLst/>
@@ -2530,13 +2673,27 @@
             </a:solidFill>
           </a:ln>
         </p:spPr>
+        <p:style>
+          <a:lnRef idx="0"/>
+          <a:fillRef idx="0"/>
+          <a:effectRef idx="0"/>
+          <a:fontRef idx="minor"/>
+        </p:style>
         <p:txBody>
           <a:bodyPr lIns="90000" rIns="90000" tIns="45000" bIns="45000"/>
           <a:p>
-            <a:pPr algn="ctr"/>
+            <a:pPr algn="ctr">
+              <a:lnSpc>
+                <a:spcPct val="100000"/>
+              </a:lnSpc>
+            </a:pPr>
             <a:r>
               <a:rPr b="0" lang="en-US" sz="1050" spc="-1" strike="noStrike">
-                <a:latin typeface="Arial"/>
+                <a:solidFill>
+                  <a:srgbClr val="000000"/>
+                </a:solidFill>
+                <a:latin typeface="Arial"/>
+                <a:ea typeface="DejaVu Sans"/>
               </a:rPr>
               <a:t>gazebo_bridge</a:t>
             </a:r>
@@ -2548,14 +2705,14 @@
       </p:sp>
       <p:sp>
         <p:nvSpPr>
-          <p:cNvPr id="63" name="TextShape 23"/>
-          <p:cNvSpPr txBox="1"/>
-          <p:nvPr/>
-        </p:nvSpPr>
-        <p:spPr>
-          <a:xfrm>
-            <a:off x="6802560" y="2540880"/>
-            <a:ext cx="1188720" cy="512640"/>
+          <p:cNvPr id="60" name="CustomShape 23"/>
+          <p:cNvSpPr/>
+          <p:nvPr/>
+        </p:nvSpPr>
+        <p:spPr>
+          <a:xfrm>
+            <a:off x="6802560" y="2377440"/>
+            <a:ext cx="1187280" cy="511200"/>
           </a:xfrm>
           <a:prstGeom prst="rect">
             <a:avLst/>
@@ -2567,13 +2724,27 @@
             <a:noFill/>
           </a:ln>
         </p:spPr>
+        <p:style>
+          <a:lnRef idx="0"/>
+          <a:fillRef idx="0"/>
+          <a:effectRef idx="0"/>
+          <a:fontRef idx="minor"/>
+        </p:style>
         <p:txBody>
           <a:bodyPr lIns="90000" rIns="90000" tIns="45000" bIns="45000" anchor="ctr"/>
           <a:p>
-            <a:pPr algn="ctr"/>
+            <a:pPr algn="ctr">
+              <a:lnSpc>
+                <a:spcPct val="100000"/>
+              </a:lnSpc>
+            </a:pPr>
             <a:r>
               <a:rPr b="0" lang="en-US" sz="1050" spc="-1" strike="noStrike">
-                <a:latin typeface="Arial"/>
+                <a:solidFill>
+                  <a:srgbClr val="000000"/>
+                </a:solidFill>
+                <a:latin typeface="Arial"/>
+                <a:ea typeface="DejaVu Sans"/>
               </a:rPr>
               <a:t>Shared memory</a:t>
             </a:r>
@@ -2585,14 +2756,14 @@
       </p:sp>
       <p:sp>
         <p:nvSpPr>
-          <p:cNvPr id="64" name="TextShape 24"/>
-          <p:cNvSpPr txBox="1"/>
+          <p:cNvPr id="61" name="CustomShape 24"/>
+          <p:cNvSpPr/>
           <p:nvPr/>
         </p:nvSpPr>
         <p:spPr>
           <a:xfrm>
             <a:off x="5730480" y="3605040"/>
-            <a:ext cx="1371600" cy="386280"/>
+            <a:ext cx="1370160" cy="384840"/>
           </a:xfrm>
           <a:prstGeom prst="rect">
             <a:avLst/>
@@ -2606,13 +2777,27 @@
             </a:solidFill>
           </a:ln>
         </p:spPr>
+        <p:style>
+          <a:lnRef idx="0"/>
+          <a:fillRef idx="0"/>
+          <a:effectRef idx="0"/>
+          <a:fontRef idx="minor"/>
+        </p:style>
         <p:txBody>
           <a:bodyPr lIns="90000" rIns="90000" tIns="45000" bIns="45000"/>
           <a:p>
-            <a:pPr algn="ctr"/>
+            <a:pPr algn="ctr">
+              <a:lnSpc>
+                <a:spcPct val="100000"/>
+              </a:lnSpc>
+            </a:pPr>
             <a:r>
               <a:rPr b="0" lang="en-US" sz="1050" spc="-1" strike="noStrike">
-                <a:latin typeface="Arial"/>
+                <a:solidFill>
+                  <a:srgbClr val="000000"/>
+                </a:solidFill>
+                <a:latin typeface="Arial"/>
+                <a:ea typeface="DejaVu Sans"/>
               </a:rPr>
               <a:t>wbc2_web_operator</a:t>
             </a:r>
@@ -2621,10 +2806,18 @@
             </a:endParaRPr>
           </a:p>
           <a:p>
-            <a:pPr algn="ctr"/>
+            <a:pPr algn="ctr">
+              <a:lnSpc>
+                <a:spcPct val="100000"/>
+              </a:lnSpc>
+            </a:pPr>
             <a:r>
               <a:rPr b="0" lang="en-US" sz="1050" spc="-1" strike="noStrike">
-                <a:latin typeface="Arial"/>
+                <a:solidFill>
+                  <a:srgbClr val="000000"/>
+                </a:solidFill>
+                <a:latin typeface="Arial"/>
+                <a:ea typeface="DejaVu Sans"/>
               </a:rPr>
               <a:t>(proc3, HW-A or B)</a:t>
             </a:r>
@@ -2636,14 +2829,14 @@
       </p:sp>
       <p:sp>
         <p:nvSpPr>
-          <p:cNvPr id="65" name="TextShape 25"/>
-          <p:cNvSpPr txBox="1"/>
+          <p:cNvPr id="62" name="CustomShape 25"/>
+          <p:cNvSpPr/>
           <p:nvPr/>
         </p:nvSpPr>
         <p:spPr>
           <a:xfrm>
             <a:off x="5893920" y="4189320"/>
-            <a:ext cx="1645920" cy="238680"/>
+            <a:ext cx="1644480" cy="237240"/>
           </a:xfrm>
           <a:prstGeom prst="rect">
             <a:avLst/>
@@ -2655,13 +2848,27 @@
             </a:solidFill>
           </a:ln>
         </p:spPr>
+        <p:style>
+          <a:lnRef idx="0"/>
+          <a:fillRef idx="0"/>
+          <a:effectRef idx="0"/>
+          <a:fontRef idx="minor"/>
+        </p:style>
         <p:txBody>
           <a:bodyPr lIns="90000" rIns="90000" tIns="45000" bIns="45000"/>
           <a:p>
-            <a:pPr algn="ctr"/>
+            <a:pPr algn="ctr">
+              <a:lnSpc>
+                <a:spcPct val="100000"/>
+              </a:lnSpc>
+            </a:pPr>
             <a:r>
               <a:rPr b="0" lang="en-US" sz="1050" spc="-1" strike="noStrike">
-                <a:latin typeface="Arial"/>
+                <a:solidFill>
+                  <a:srgbClr val="000000"/>
+                </a:solidFill>
+                <a:latin typeface="Arial"/>
+                <a:ea typeface="DejaVu Sans"/>
               </a:rPr>
               <a:t>operator (send signal)</a:t>
             </a:r>
@@ -2673,14 +2880,14 @@
       </p:sp>
       <p:sp>
         <p:nvSpPr>
-          <p:cNvPr id="66" name="TextShape 26"/>
-          <p:cNvSpPr txBox="1"/>
+          <p:cNvPr id="63" name="CustomShape 26"/>
+          <p:cNvSpPr/>
           <p:nvPr/>
         </p:nvSpPr>
         <p:spPr>
           <a:xfrm>
             <a:off x="5893920" y="4555080"/>
-            <a:ext cx="1645920" cy="238680"/>
+            <a:ext cx="1644480" cy="237240"/>
           </a:xfrm>
           <a:prstGeom prst="rect">
             <a:avLst/>
@@ -2692,13 +2899,27 @@
             </a:solidFill>
           </a:ln>
         </p:spPr>
+        <p:style>
+          <a:lnRef idx="0"/>
+          <a:fillRef idx="0"/>
+          <a:effectRef idx="0"/>
+          <a:fontRef idx="minor"/>
+        </p:style>
         <p:txBody>
           <a:bodyPr lIns="90000" rIns="90000" tIns="45000" bIns="45000"/>
           <a:p>
-            <a:pPr algn="ctr"/>
+            <a:pPr algn="ctr">
+              <a:lnSpc>
+                <a:spcPct val="100000"/>
+              </a:lnSpc>
+            </a:pPr>
             <a:r>
               <a:rPr b="0" lang="en-US" sz="1050" spc="-1" strike="noStrike">
-                <a:latin typeface="Arial"/>
+                <a:solidFill>
+                  <a:srgbClr val="000000"/>
+                </a:solidFill>
+                <a:latin typeface="Arial"/>
+                <a:ea typeface="DejaVu Sans"/>
               </a:rPr>
               <a:t>visualizer (chart)</a:t>
             </a:r>
@@ -2708,16 +2929,530 @@
           </a:p>
         </p:txBody>
       </p:sp>
-      <p:cxnSp>
-        <p:nvCxnSpPr>
-          <p:cNvPr id="67" name="Line 27"/>
-          <p:cNvCxnSpPr/>
-          <p:nvPr/>
-        </p:nvCxnSpPr>
-        <p:spPr>
-          <a:xfrm>
-            <a:off x="0" y="0"/>
-            <a:ext cx="360" cy="360"/>
+      <p:sp>
+        <p:nvSpPr>
+          <p:cNvPr id="64" name="CustomShape 27"/>
+          <p:cNvSpPr/>
+          <p:nvPr/>
+        </p:nvSpPr>
+        <p:spPr>
+          <a:xfrm>
+            <a:off x="4995360" y="994320"/>
+            <a:ext cx="1642320" cy="236880"/>
+          </a:xfrm>
+          <a:prstGeom prst="rect">
+            <a:avLst/>
+          </a:prstGeom>
+          <a:noFill/>
+          <a:ln>
+            <a:noFill/>
+          </a:ln>
+        </p:spPr>
+        <p:style>
+          <a:lnRef idx="0"/>
+          <a:fillRef idx="0"/>
+          <a:effectRef idx="0"/>
+          <a:fontRef idx="minor"/>
+        </p:style>
+        <p:txBody>
+          <a:bodyPr lIns="90000" rIns="90000" tIns="45000" bIns="45000"/>
+          <a:p>
+            <a:pPr>
+              <a:lnSpc>
+                <a:spcPct val="100000"/>
+              </a:lnSpc>
+            </a:pPr>
+            <a:r>
+              <a:rPr b="0" lang="en-US" sz="1050" spc="-1" strike="noStrike">
+                <a:solidFill>
+                  <a:srgbClr val="000000"/>
+                </a:solidFill>
+                <a:latin typeface="Arial"/>
+                <a:ea typeface="DejaVu Sans"/>
+              </a:rPr>
+              <a:t>Initialize, configure</a:t>
+            </a:r>
+            <a:endParaRPr b="0" lang="en-US" sz="1050" spc="-1" strike="noStrike">
+              <a:latin typeface="Arial"/>
+            </a:endParaRPr>
+          </a:p>
+        </p:txBody>
+      </p:sp>
+      <p:sp>
+        <p:nvSpPr>
+          <p:cNvPr id="65" name="CustomShape 28"/>
+          <p:cNvSpPr/>
+          <p:nvPr/>
+        </p:nvSpPr>
+        <p:spPr>
+          <a:xfrm>
+            <a:off x="5120640" y="1828800"/>
+            <a:ext cx="1642320" cy="384840"/>
+          </a:xfrm>
+          <a:prstGeom prst="rect">
+            <a:avLst/>
+          </a:prstGeom>
+          <a:noFill/>
+          <a:ln>
+            <a:noFill/>
+          </a:ln>
+        </p:spPr>
+        <p:style>
+          <a:lnRef idx="0"/>
+          <a:fillRef idx="0"/>
+          <a:effectRef idx="0"/>
+          <a:fontRef idx="minor"/>
+        </p:style>
+        <p:txBody>
+          <a:bodyPr lIns="90000" rIns="90000" tIns="45000" bIns="45000"/>
+          <a:p>
+            <a:pPr algn="ctr">
+              <a:lnSpc>
+                <a:spcPct val="100000"/>
+              </a:lnSpc>
+            </a:pPr>
+            <a:r>
+              <a:rPr b="0" lang="en-US" sz="1050" spc="-1" strike="noStrike">
+                <a:solidFill>
+                  <a:srgbClr val="000000"/>
+                </a:solidFill>
+                <a:latin typeface="Arial"/>
+                <a:ea typeface="DejaVu Sans"/>
+              </a:rPr>
+              <a:t>tref or qref(send),</a:t>
+            </a:r>
+            <a:br/>
+            <a:r>
+              <a:rPr b="0" lang="en-US" sz="1050" spc="-1" strike="noStrike">
+                <a:solidFill>
+                  <a:srgbClr val="000000"/>
+                </a:solidFill>
+                <a:latin typeface="Arial"/>
+                <a:ea typeface="DejaVu Sans"/>
+              </a:rPr>
+              <a:t>q(receive)</a:t>
+            </a:r>
+            <a:endParaRPr b="0" lang="en-US" sz="1050" spc="-1" strike="noStrike">
+              <a:latin typeface="Arial"/>
+            </a:endParaRPr>
+          </a:p>
+        </p:txBody>
+      </p:sp>
+      <p:sp>
+        <p:nvSpPr>
+          <p:cNvPr id="66" name="CustomShape 29"/>
+          <p:cNvSpPr/>
+          <p:nvPr/>
+        </p:nvSpPr>
+        <p:spPr>
+          <a:xfrm rot="16200000">
+            <a:off x="7947360" y="1654560"/>
+            <a:ext cx="1642320" cy="384840"/>
+          </a:xfrm>
+          <a:prstGeom prst="rect">
+            <a:avLst/>
+          </a:prstGeom>
+          <a:noFill/>
+          <a:ln>
+            <a:noFill/>
+          </a:ln>
+        </p:spPr>
+        <p:style>
+          <a:lnRef idx="0"/>
+          <a:fillRef idx="0"/>
+          <a:effectRef idx="0"/>
+          <a:fontRef idx="minor"/>
+        </p:style>
+        <p:txBody>
+          <a:bodyPr lIns="90000" rIns="90000" tIns="45000" bIns="45000"/>
+          <a:p>
+            <a:pPr algn="ctr">
+              <a:lnSpc>
+                <a:spcPct val="100000"/>
+              </a:lnSpc>
+            </a:pPr>
+            <a:r>
+              <a:rPr b="0" lang="en-US" sz="1050" spc="-1" strike="noStrike">
+                <a:solidFill>
+                  <a:srgbClr val="000000"/>
+                </a:solidFill>
+                <a:latin typeface="Arial"/>
+                <a:ea typeface="DejaVu Sans"/>
+              </a:rPr>
+              <a:t>tref or qref(send),</a:t>
+            </a:r>
+            <a:br/>
+            <a:r>
+              <a:rPr b="0" lang="en-US" sz="1050" spc="-1" strike="noStrike">
+                <a:solidFill>
+                  <a:srgbClr val="000000"/>
+                </a:solidFill>
+                <a:latin typeface="Arial"/>
+                <a:ea typeface="DejaVu Sans"/>
+              </a:rPr>
+              <a:t>q(receive)</a:t>
+            </a:r>
+            <a:endParaRPr b="0" lang="en-US" sz="1050" spc="-1" strike="noStrike">
+              <a:latin typeface="Arial"/>
+            </a:endParaRPr>
+          </a:p>
+        </p:txBody>
+      </p:sp>
+      <p:sp>
+        <p:nvSpPr>
+          <p:cNvPr id="67" name="CustomShape 30"/>
+          <p:cNvSpPr/>
+          <p:nvPr/>
+        </p:nvSpPr>
+        <p:spPr>
+          <a:xfrm>
+            <a:off x="2106360" y="3146040"/>
+            <a:ext cx="1642320" cy="236880"/>
+          </a:xfrm>
+          <a:prstGeom prst="rect">
+            <a:avLst/>
+          </a:prstGeom>
+          <a:noFill/>
+          <a:ln>
+            <a:noFill/>
+          </a:ln>
+        </p:spPr>
+        <p:style>
+          <a:lnRef idx="0"/>
+          <a:fillRef idx="0"/>
+          <a:effectRef idx="0"/>
+          <a:fontRef idx="minor"/>
+        </p:style>
+        <p:txBody>
+          <a:bodyPr lIns="90000" rIns="90000" tIns="45000" bIns="45000"/>
+          <a:p>
+            <a:pPr algn="ctr">
+              <a:lnSpc>
+                <a:spcPct val="100000"/>
+              </a:lnSpc>
+            </a:pPr>
+            <a:r>
+              <a:rPr b="0" lang="en-US" sz="1050" spc="-1" strike="noStrike">
+                <a:solidFill>
+                  <a:srgbClr val="000000"/>
+                </a:solidFill>
+                <a:latin typeface="Arial"/>
+                <a:ea typeface="DejaVu Sans"/>
+              </a:rPr>
+              <a:t>xref, ctrl_params, q</a:t>
+            </a:r>
+            <a:endParaRPr b="0" lang="en-US" sz="1050" spc="-1" strike="noStrike">
+              <a:latin typeface="Arial"/>
+            </a:endParaRPr>
+          </a:p>
+        </p:txBody>
+      </p:sp>
+      <p:sp>
+        <p:nvSpPr>
+          <p:cNvPr id="68" name="CustomShape 31"/>
+          <p:cNvSpPr/>
+          <p:nvPr/>
+        </p:nvSpPr>
+        <p:spPr>
+          <a:xfrm>
+            <a:off x="1737360" y="4101840"/>
+            <a:ext cx="1096560" cy="236880"/>
+          </a:xfrm>
+          <a:prstGeom prst="rect">
+            <a:avLst/>
+          </a:prstGeom>
+          <a:noFill/>
+          <a:ln>
+            <a:noFill/>
+          </a:ln>
+        </p:spPr>
+        <p:style>
+          <a:lnRef idx="0"/>
+          <a:fillRef idx="0"/>
+          <a:effectRef idx="0"/>
+          <a:fontRef idx="minor"/>
+        </p:style>
+        <p:txBody>
+          <a:bodyPr lIns="90000" rIns="90000" tIns="45000" bIns="45000"/>
+          <a:p>
+            <a:pPr algn="ctr">
+              <a:lnSpc>
+                <a:spcPct val="100000"/>
+              </a:lnSpc>
+            </a:pPr>
+            <a:r>
+              <a:rPr b="0" lang="en-US" sz="1050" spc="-1" strike="noStrike">
+                <a:solidFill>
+                  <a:srgbClr val="000000"/>
+                </a:solidFill>
+                <a:latin typeface="Arial"/>
+                <a:ea typeface="DejaVu Sans"/>
+              </a:rPr>
+              <a:t>ctrl_params</a:t>
+            </a:r>
+            <a:endParaRPr b="0" lang="en-US" sz="1050" spc="-1" strike="noStrike">
+              <a:latin typeface="Arial"/>
+            </a:endParaRPr>
+          </a:p>
+        </p:txBody>
+      </p:sp>
+      <p:sp>
+        <p:nvSpPr>
+          <p:cNvPr id="69" name="CustomShape 32"/>
+          <p:cNvSpPr/>
+          <p:nvPr/>
+        </p:nvSpPr>
+        <p:spPr>
+          <a:xfrm>
+            <a:off x="1728720" y="4461840"/>
+            <a:ext cx="1096560" cy="236880"/>
+          </a:xfrm>
+          <a:prstGeom prst="rect">
+            <a:avLst/>
+          </a:prstGeom>
+          <a:noFill/>
+          <a:ln>
+            <a:noFill/>
+          </a:ln>
+        </p:spPr>
+        <p:style>
+          <a:lnRef idx="0"/>
+          <a:fillRef idx="0"/>
+          <a:effectRef idx="0"/>
+          <a:fontRef idx="minor"/>
+        </p:style>
+        <p:txBody>
+          <a:bodyPr lIns="90000" rIns="90000" tIns="45000" bIns="45000"/>
+          <a:p>
+            <a:pPr algn="ctr">
+              <a:lnSpc>
+                <a:spcPct val="100000"/>
+              </a:lnSpc>
+            </a:pPr>
+            <a:r>
+              <a:rPr b="0" lang="en-US" sz="1050" spc="-1" strike="noStrike">
+                <a:solidFill>
+                  <a:srgbClr val="000000"/>
+                </a:solidFill>
+                <a:latin typeface="Arial"/>
+                <a:ea typeface="DejaVu Sans"/>
+              </a:rPr>
+              <a:t>xref</a:t>
+            </a:r>
+            <a:endParaRPr b="0" lang="en-US" sz="1050" spc="-1" strike="noStrike">
+              <a:latin typeface="Arial"/>
+            </a:endParaRPr>
+          </a:p>
+        </p:txBody>
+      </p:sp>
+      <p:sp>
+        <p:nvSpPr>
+          <p:cNvPr id="70" name="CustomShape 33"/>
+          <p:cNvSpPr/>
+          <p:nvPr/>
+        </p:nvSpPr>
+        <p:spPr>
+          <a:xfrm>
+            <a:off x="3162600" y="4973760"/>
+            <a:ext cx="1461600" cy="237240"/>
+          </a:xfrm>
+          <a:prstGeom prst="rect">
+            <a:avLst/>
+          </a:prstGeom>
+          <a:noFill/>
+          <a:ln>
+            <a:solidFill>
+              <a:srgbClr val="3465a4"/>
+            </a:solidFill>
+          </a:ln>
+        </p:spPr>
+        <p:style>
+          <a:lnRef idx="0"/>
+          <a:fillRef idx="0"/>
+          <a:effectRef idx="0"/>
+          <a:fontRef idx="minor"/>
+        </p:style>
+        <p:txBody>
+          <a:bodyPr lIns="90000" rIns="90000" tIns="45000" bIns="45000"/>
+          <a:p>
+            <a:pPr algn="ctr">
+              <a:lnSpc>
+                <a:spcPct val="100000"/>
+              </a:lnSpc>
+            </a:pPr>
+            <a:r>
+              <a:rPr b="0" lang="en-US" sz="1050" spc="-1" strike="noStrike">
+                <a:solidFill>
+                  <a:srgbClr val="000000"/>
+                </a:solidFill>
+                <a:latin typeface="Arial"/>
+                <a:ea typeface="DejaVu Sans"/>
+              </a:rPr>
+              <a:t>state_observer</a:t>
+            </a:r>
+            <a:endParaRPr b="0" lang="en-US" sz="1050" spc="-1" strike="noStrike">
+              <a:latin typeface="Arial"/>
+            </a:endParaRPr>
+          </a:p>
+        </p:txBody>
+      </p:sp>
+      <p:sp>
+        <p:nvSpPr>
+          <p:cNvPr id="71" name="CustomShape 34"/>
+          <p:cNvSpPr/>
+          <p:nvPr/>
+        </p:nvSpPr>
+        <p:spPr>
+          <a:xfrm>
+            <a:off x="1738080" y="4874760"/>
+            <a:ext cx="1096560" cy="236880"/>
+          </a:xfrm>
+          <a:prstGeom prst="rect">
+            <a:avLst/>
+          </a:prstGeom>
+          <a:noFill/>
+          <a:ln>
+            <a:noFill/>
+          </a:ln>
+        </p:spPr>
+        <p:style>
+          <a:lnRef idx="0"/>
+          <a:fillRef idx="0"/>
+          <a:effectRef idx="0"/>
+          <a:fontRef idx="minor"/>
+        </p:style>
+        <p:txBody>
+          <a:bodyPr lIns="90000" rIns="90000" tIns="45000" bIns="45000"/>
+          <a:p>
+            <a:pPr algn="ctr">
+              <a:lnSpc>
+                <a:spcPct val="100000"/>
+              </a:lnSpc>
+            </a:pPr>
+            <a:r>
+              <a:rPr b="0" lang="en-US" sz="1050" spc="-1" strike="noStrike">
+                <a:solidFill>
+                  <a:srgbClr val="000000"/>
+                </a:solidFill>
+                <a:latin typeface="Arial"/>
+                <a:ea typeface="DejaVu Sans"/>
+              </a:rPr>
+              <a:t>q</a:t>
+            </a:r>
+            <a:endParaRPr b="0" lang="en-US" sz="1050" spc="-1" strike="noStrike">
+              <a:latin typeface="Arial"/>
+            </a:endParaRPr>
+          </a:p>
+        </p:txBody>
+      </p:sp>
+      <p:sp>
+        <p:nvSpPr>
+          <p:cNvPr id="72" name="CustomShape 35"/>
+          <p:cNvSpPr/>
+          <p:nvPr/>
+        </p:nvSpPr>
+        <p:spPr>
+          <a:xfrm>
+            <a:off x="4937760" y="4024800"/>
+            <a:ext cx="717840" cy="237240"/>
+          </a:xfrm>
+          <a:prstGeom prst="rect">
+            <a:avLst/>
+          </a:prstGeom>
+          <a:noFill/>
+          <a:ln>
+            <a:noFill/>
+          </a:ln>
+        </p:spPr>
+        <p:style>
+          <a:lnRef idx="0"/>
+          <a:fillRef idx="0"/>
+          <a:effectRef idx="0"/>
+          <a:fontRef idx="minor"/>
+        </p:style>
+        <p:txBody>
+          <a:bodyPr lIns="90000" rIns="90000" tIns="45000" bIns="45000"/>
+          <a:p>
+            <a:pPr>
+              <a:lnSpc>
+                <a:spcPct val="100000"/>
+              </a:lnSpc>
+            </a:pPr>
+            <a:r>
+              <a:rPr b="0" lang="en-US" sz="1050" spc="-1" strike="noStrike">
+                <a:solidFill>
+                  <a:srgbClr val="000000"/>
+                </a:solidFill>
+                <a:latin typeface="Arial"/>
+                <a:ea typeface="DejaVu Sans"/>
+              </a:rPr>
+              <a:t>(TCP/IP)</a:t>
+            </a:r>
+            <a:endParaRPr b="0" lang="en-US" sz="1050" spc="-1" strike="noStrike">
+              <a:latin typeface="Arial"/>
+            </a:endParaRPr>
+          </a:p>
+        </p:txBody>
+      </p:sp>
+      <p:sp>
+        <p:nvSpPr>
+          <p:cNvPr id="73" name="CustomShape 36"/>
+          <p:cNvSpPr/>
+          <p:nvPr/>
+        </p:nvSpPr>
+        <p:spPr>
+          <a:xfrm>
+            <a:off x="7736400" y="492840"/>
+            <a:ext cx="491760" cy="237240"/>
+          </a:xfrm>
+          <a:prstGeom prst="rect">
+            <a:avLst/>
+          </a:prstGeom>
+          <a:noFill/>
+          <a:ln>
+            <a:noFill/>
+          </a:ln>
+        </p:spPr>
+        <p:style>
+          <a:lnRef idx="0"/>
+          <a:fillRef idx="0"/>
+          <a:effectRef idx="0"/>
+          <a:fontRef idx="minor"/>
+        </p:style>
+        <p:txBody>
+          <a:bodyPr lIns="90000" rIns="90000" tIns="45000" bIns="45000"/>
+          <a:p>
+            <a:pPr>
+              <a:lnSpc>
+                <a:spcPct val="100000"/>
+              </a:lnSpc>
+            </a:pPr>
+            <a:r>
+              <a:rPr b="0" lang="en-US" sz="1050" spc="-1" strike="noStrike">
+                <a:solidFill>
+                  <a:srgbClr val="000000"/>
+                </a:solidFill>
+                <a:latin typeface="Arial"/>
+                <a:ea typeface="DejaVu Sans"/>
+              </a:rPr>
+              <a:t>OR</a:t>
+            </a:r>
+            <a:endParaRPr b="0" lang="en-US" sz="1050" spc="-1" strike="noStrike">
+              <a:latin typeface="Arial"/>
+            </a:endParaRPr>
+          </a:p>
+        </p:txBody>
+      </p:sp>
+      <p:sp>
+        <p:nvSpPr>
+          <p:cNvPr id="74" name="Line 37"/>
+          <p:cNvSpPr/>
+          <p:nvPr/>
+        </p:nvSpPr>
+        <p:spPr>
+          <a:xfrm>
+            <a:off x="3803760" y="1024920"/>
+            <a:ext cx="4974480" cy="360"/>
           </a:xfrm>
           <a:prstGeom prst="line">
             <a:avLst/>
@@ -2726,96 +3461,497 @@
             <a:solidFill>
               <a:srgbClr val="000000"/>
             </a:solidFill>
+          </a:ln>
+        </p:spPr>
+        <p:style>
+          <a:lnRef idx="0"/>
+          <a:fillRef idx="0"/>
+          <a:effectRef idx="0"/>
+          <a:fontRef idx="minor"/>
+        </p:style>
+      </p:sp>
+      <p:sp>
+        <p:nvSpPr>
+          <p:cNvPr id="75" name="Line 38"/>
+          <p:cNvSpPr/>
+          <p:nvPr/>
+        </p:nvSpPr>
+        <p:spPr>
+          <a:xfrm flipH="1">
+            <a:off x="2144160" y="1919880"/>
+            <a:ext cx="324720" cy="360"/>
+          </a:xfrm>
+          <a:prstGeom prst="line">
+            <a:avLst/>
+          </a:prstGeom>
+          <a:ln>
+            <a:solidFill>
+              <a:srgbClr val="000000"/>
+            </a:solidFill>
+          </a:ln>
+        </p:spPr>
+        <p:style>
+          <a:lnRef idx="0"/>
+          <a:fillRef idx="0"/>
+          <a:effectRef idx="0"/>
+          <a:fontRef idx="minor"/>
+        </p:style>
+      </p:sp>
+      <p:sp>
+        <p:nvSpPr>
+          <p:cNvPr id="76" name="Line 39"/>
+          <p:cNvSpPr/>
+          <p:nvPr/>
+        </p:nvSpPr>
+        <p:spPr>
+          <a:xfrm>
+            <a:off x="2144160" y="1920240"/>
+            <a:ext cx="0" cy="112680"/>
+          </a:xfrm>
+          <a:prstGeom prst="line">
+            <a:avLst/>
+          </a:prstGeom>
+          <a:ln>
+            <a:solidFill>
+              <a:srgbClr val="000000"/>
+            </a:solidFill>
             <a:tailEnd len="med" type="triangle" w="med"/>
           </a:ln>
         </p:spPr>
-      </p:cxnSp>
-      <p:sp>
-        <p:nvSpPr>
-          <p:cNvPr id="68" name="TextShape 28"/>
-          <p:cNvSpPr txBox="1"/>
-          <p:nvPr/>
-        </p:nvSpPr>
-        <p:spPr>
-          <a:xfrm>
-            <a:off x="4995360" y="994320"/>
-            <a:ext cx="1643760" cy="238320"/>
-          </a:xfrm>
-          <a:prstGeom prst="rect">
-            <a:avLst/>
-          </a:prstGeom>
-          <a:noFill/>
-          <a:ln>
-            <a:noFill/>
-          </a:ln>
-        </p:spPr>
-        <p:txBody>
-          <a:bodyPr lIns="90000" rIns="90000" tIns="45000" bIns="45000"/>
-          <a:p>
-            <a:r>
-              <a:rPr b="0" lang="en-US" sz="1050" spc="-1" strike="noStrike">
-                <a:latin typeface="Arial"/>
-              </a:rPr>
-              <a:t>Initialize, configure</a:t>
-            </a:r>
-            <a:endParaRPr b="0" lang="en-US" sz="1050" spc="-1" strike="noStrike">
-              <a:latin typeface="Arial"/>
-            </a:endParaRPr>
-          </a:p>
-        </p:txBody>
-      </p:sp>
-      <p:sp>
-        <p:nvSpPr>
-          <p:cNvPr id="69" name="TextShape 29"/>
-          <p:cNvSpPr txBox="1"/>
-          <p:nvPr/>
-        </p:nvSpPr>
-        <p:spPr>
-          <a:xfrm>
-            <a:off x="5120640" y="1828800"/>
-            <a:ext cx="1643760" cy="386280"/>
-          </a:xfrm>
-          <a:prstGeom prst="rect">
-            <a:avLst/>
-          </a:prstGeom>
-          <a:noFill/>
-          <a:ln>
-            <a:noFill/>
-          </a:ln>
-        </p:spPr>
-        <p:txBody>
-          <a:bodyPr lIns="90000" rIns="90000" tIns="45000" bIns="45000"/>
-          <a:p>
-            <a:pPr algn="ctr"/>
-            <a:r>
-              <a:rPr b="0" lang="en-US" sz="1050" spc="-1" strike="noStrike">
-                <a:latin typeface="Arial"/>
-              </a:rPr>
-              <a:t>tref or qref(send),</a:t>
-            </a:r>
-            <a:br/>
-            <a:r>
-              <a:rPr b="0" lang="en-US" sz="1050" spc="-1" strike="noStrike">
-                <a:latin typeface="Arial"/>
-              </a:rPr>
-              <a:t>q(receive)</a:t>
-            </a:r>
-            <a:endParaRPr b="0" lang="en-US" sz="1050" spc="-1" strike="noStrike">
-              <a:latin typeface="Arial"/>
-            </a:endParaRPr>
-          </a:p>
-        </p:txBody>
-      </p:sp>
-      <p:cxnSp>
-        <p:nvCxnSpPr>
-          <p:cNvPr id="70" name="Line 30"/>
-          <p:cNvCxnSpPr/>
-          <p:nvPr/>
-        </p:nvCxnSpPr>
-        <p:spPr>
-          <a:xfrm>
-            <a:off x="0" y="0"/>
-            <a:ext cx="360" cy="360"/>
+        <p:style>
+          <a:lnRef idx="0"/>
+          <a:fillRef idx="0"/>
+          <a:effectRef idx="0"/>
+          <a:fontRef idx="minor"/>
+        </p:style>
+      </p:sp>
+      <p:sp>
+        <p:nvSpPr>
+          <p:cNvPr id="77" name="Line 40"/>
+          <p:cNvSpPr/>
+          <p:nvPr/>
+        </p:nvSpPr>
+        <p:spPr>
+          <a:xfrm>
+            <a:off x="1080360" y="2524320"/>
+            <a:ext cx="505080" cy="360"/>
+          </a:xfrm>
+          <a:prstGeom prst="line">
+            <a:avLst/>
+          </a:prstGeom>
+          <a:ln>
+            <a:solidFill>
+              <a:srgbClr val="000000"/>
+            </a:solidFill>
+            <a:tailEnd len="med" type="triangle" w="med"/>
+          </a:ln>
+        </p:spPr>
+        <p:style>
+          <a:lnRef idx="0"/>
+          <a:fillRef idx="0"/>
+          <a:effectRef idx="0"/>
+          <a:fontRef idx="minor"/>
+        </p:style>
+      </p:sp>
+      <p:sp>
+        <p:nvSpPr>
+          <p:cNvPr id="78" name="Line 41"/>
+          <p:cNvSpPr/>
+          <p:nvPr/>
+        </p:nvSpPr>
+        <p:spPr>
+          <a:xfrm flipH="1">
+            <a:off x="2284920" y="3474720"/>
+            <a:ext cx="1281240" cy="360"/>
+          </a:xfrm>
+          <a:prstGeom prst="line">
+            <a:avLst/>
+          </a:prstGeom>
+          <a:ln>
+            <a:solidFill>
+              <a:srgbClr val="000000"/>
+            </a:solidFill>
+            <a:tailEnd len="med" type="triangle" w="med"/>
+          </a:ln>
+        </p:spPr>
+        <p:style>
+          <a:lnRef idx="0"/>
+          <a:fillRef idx="0"/>
+          <a:effectRef idx="0"/>
+          <a:fontRef idx="minor"/>
+        </p:style>
+      </p:sp>
+      <p:sp>
+        <p:nvSpPr>
+          <p:cNvPr id="79" name="Line 42"/>
+          <p:cNvSpPr/>
+          <p:nvPr/>
+        </p:nvSpPr>
+        <p:spPr>
+          <a:xfrm flipV="1">
+            <a:off x="3566160" y="2910600"/>
+            <a:ext cx="360" cy="564120"/>
+          </a:xfrm>
+          <a:prstGeom prst="line">
+            <a:avLst/>
+          </a:prstGeom>
+          <a:ln>
+            <a:solidFill>
+              <a:srgbClr val="000000"/>
+            </a:solidFill>
+            <a:tailEnd len="med" type="triangle" w="med"/>
+          </a:ln>
+        </p:spPr>
+        <p:style>
+          <a:lnRef idx="0"/>
+          <a:fillRef idx="0"/>
+          <a:effectRef idx="0"/>
+          <a:fontRef idx="minor"/>
+        </p:style>
+      </p:sp>
+      <p:sp>
+        <p:nvSpPr>
+          <p:cNvPr id="80" name="Line 43"/>
+          <p:cNvSpPr/>
+          <p:nvPr/>
+        </p:nvSpPr>
+        <p:spPr>
+          <a:xfrm flipH="1" flipV="1">
+            <a:off x="4784760" y="2194560"/>
+            <a:ext cx="1890360" cy="19440"/>
+          </a:xfrm>
+          <a:prstGeom prst="line">
+            <a:avLst/>
+          </a:prstGeom>
+          <a:ln>
+            <a:solidFill>
+              <a:srgbClr val="000000"/>
+            </a:solidFill>
+            <a:tailEnd len="med" type="triangle" w="med"/>
+          </a:ln>
+        </p:spPr>
+        <p:style>
+          <a:lnRef idx="0"/>
+          <a:fillRef idx="0"/>
+          <a:effectRef idx="0"/>
+          <a:fontRef idx="minor"/>
+        </p:style>
+      </p:sp>
+      <p:sp>
+        <p:nvSpPr>
+          <p:cNvPr id="81" name="Line 44"/>
+          <p:cNvSpPr/>
+          <p:nvPr/>
+        </p:nvSpPr>
+        <p:spPr>
+          <a:xfrm flipV="1">
+            <a:off x="6675120" y="864000"/>
+            <a:ext cx="360" cy="1350000"/>
+          </a:xfrm>
+          <a:prstGeom prst="line">
+            <a:avLst/>
+          </a:prstGeom>
+          <a:ln>
+            <a:solidFill>
+              <a:srgbClr val="000000"/>
+            </a:solidFill>
+            <a:tailEnd len="med" type="triangle" w="med"/>
+          </a:ln>
+        </p:spPr>
+        <p:style>
+          <a:lnRef idx="0"/>
+          <a:fillRef idx="0"/>
+          <a:effectRef idx="0"/>
+          <a:fontRef idx="minor"/>
+        </p:style>
+      </p:sp>
+      <p:sp>
+        <p:nvSpPr>
+          <p:cNvPr id="82" name="Line 45"/>
+          <p:cNvSpPr/>
+          <p:nvPr/>
+        </p:nvSpPr>
+        <p:spPr>
+          <a:xfrm flipV="1">
+            <a:off x="1920240" y="3747960"/>
+            <a:ext cx="360" cy="591120"/>
+          </a:xfrm>
+          <a:prstGeom prst="line">
+            <a:avLst/>
+          </a:prstGeom>
+          <a:ln>
+            <a:solidFill>
+              <a:srgbClr val="000000"/>
+            </a:solidFill>
+            <a:tailEnd len="med" type="triangle" w="med"/>
+          </a:ln>
+        </p:spPr>
+        <p:style>
+          <a:lnRef idx="0"/>
+          <a:fillRef idx="0"/>
+          <a:effectRef idx="0"/>
+          <a:fontRef idx="minor"/>
+        </p:style>
+      </p:sp>
+      <p:sp>
+        <p:nvSpPr>
+          <p:cNvPr id="83" name="Line 46"/>
+          <p:cNvSpPr/>
+          <p:nvPr/>
+        </p:nvSpPr>
+        <p:spPr>
+          <a:xfrm>
+            <a:off x="1920240" y="4339080"/>
+            <a:ext cx="1230480" cy="360"/>
+          </a:xfrm>
+          <a:prstGeom prst="line">
+            <a:avLst/>
+          </a:prstGeom>
+          <a:ln>
+            <a:solidFill>
+              <a:srgbClr val="000000"/>
+            </a:solidFill>
+          </a:ln>
+        </p:spPr>
+        <p:style>
+          <a:lnRef idx="0"/>
+          <a:fillRef idx="0"/>
+          <a:effectRef idx="0"/>
+          <a:fontRef idx="minor"/>
+        </p:style>
+      </p:sp>
+      <p:sp>
+        <p:nvSpPr>
+          <p:cNvPr id="84" name="Line 47"/>
+          <p:cNvSpPr/>
+          <p:nvPr/>
+        </p:nvSpPr>
+        <p:spPr>
+          <a:xfrm flipV="1">
+            <a:off x="1728720" y="3747960"/>
+            <a:ext cx="8640" cy="951120"/>
+          </a:xfrm>
+          <a:prstGeom prst="line">
+            <a:avLst/>
+          </a:prstGeom>
+          <a:ln>
+            <a:solidFill>
+              <a:srgbClr val="000000"/>
+            </a:solidFill>
+            <a:tailEnd len="med" type="triangle" w="med"/>
+          </a:ln>
+        </p:spPr>
+        <p:style>
+          <a:lnRef idx="0"/>
+          <a:fillRef idx="0"/>
+          <a:effectRef idx="0"/>
+          <a:fontRef idx="minor"/>
+        </p:style>
+      </p:sp>
+      <p:sp>
+        <p:nvSpPr>
+          <p:cNvPr id="85" name="Line 48"/>
+          <p:cNvSpPr/>
+          <p:nvPr/>
+        </p:nvSpPr>
+        <p:spPr>
+          <a:xfrm>
+            <a:off x="1728720" y="4699080"/>
+            <a:ext cx="1422000" cy="360"/>
+          </a:xfrm>
+          <a:prstGeom prst="line">
+            <a:avLst/>
+          </a:prstGeom>
+          <a:ln>
+            <a:solidFill>
+              <a:srgbClr val="000000"/>
+            </a:solidFill>
+          </a:ln>
+        </p:spPr>
+        <p:style>
+          <a:lnRef idx="0"/>
+          <a:fillRef idx="0"/>
+          <a:effectRef idx="0"/>
+          <a:fontRef idx="minor"/>
+        </p:style>
+      </p:sp>
+      <p:sp>
+        <p:nvSpPr>
+          <p:cNvPr id="86" name="Line 49"/>
+          <p:cNvSpPr/>
+          <p:nvPr/>
+        </p:nvSpPr>
+        <p:spPr>
+          <a:xfrm>
+            <a:off x="1554480" y="5120640"/>
+            <a:ext cx="1608120" cy="360"/>
+          </a:xfrm>
+          <a:prstGeom prst="line">
+            <a:avLst/>
+          </a:prstGeom>
+          <a:ln>
+            <a:solidFill>
+              <a:srgbClr val="000000"/>
+            </a:solidFill>
+            <a:tailEnd len="med" type="triangle" w="med"/>
+          </a:ln>
+        </p:spPr>
+        <p:style>
+          <a:lnRef idx="0"/>
+          <a:fillRef idx="0"/>
+          <a:effectRef idx="0"/>
+          <a:fontRef idx="minor"/>
+        </p:style>
+      </p:sp>
+      <p:sp>
+        <p:nvSpPr>
+          <p:cNvPr id="87" name="Line 50"/>
+          <p:cNvSpPr/>
+          <p:nvPr/>
+        </p:nvSpPr>
+        <p:spPr>
+          <a:xfrm flipV="1">
+            <a:off x="1554480" y="3747960"/>
+            <a:ext cx="360" cy="1372680"/>
+          </a:xfrm>
+          <a:prstGeom prst="line">
+            <a:avLst/>
+          </a:prstGeom>
+          <a:ln>
+            <a:solidFill>
+              <a:srgbClr val="000000"/>
+            </a:solidFill>
+          </a:ln>
+        </p:spPr>
+        <p:style>
+          <a:lnRef idx="0"/>
+          <a:fillRef idx="0"/>
+          <a:effectRef idx="0"/>
+          <a:fontRef idx="minor"/>
+        </p:style>
+      </p:sp>
+      <p:sp>
+        <p:nvSpPr>
+          <p:cNvPr id="88" name="Line 51"/>
+          <p:cNvSpPr/>
+          <p:nvPr/>
+        </p:nvSpPr>
+        <p:spPr>
+          <a:xfrm>
+            <a:off x="1097280" y="1792440"/>
+            <a:ext cx="1371600" cy="360"/>
+          </a:xfrm>
+          <a:prstGeom prst="line">
+            <a:avLst/>
+          </a:prstGeom>
+          <a:ln>
+            <a:solidFill>
+              <a:srgbClr val="000000"/>
+            </a:solidFill>
+            <a:tailEnd len="med" type="triangle" w="med"/>
+          </a:ln>
+        </p:spPr>
+        <p:style>
+          <a:lnRef idx="0"/>
+          <a:fillRef idx="0"/>
+          <a:effectRef idx="0"/>
+          <a:fontRef idx="minor"/>
+        </p:style>
+      </p:sp>
+      <p:sp>
+        <p:nvSpPr>
+          <p:cNvPr id="89" name="Line 52"/>
+          <p:cNvSpPr/>
+          <p:nvPr/>
+        </p:nvSpPr>
+        <p:spPr>
+          <a:xfrm flipV="1">
+            <a:off x="8778600" y="857880"/>
+            <a:ext cx="0" cy="167040"/>
+          </a:xfrm>
+          <a:prstGeom prst="line">
+            <a:avLst/>
+          </a:prstGeom>
+          <a:ln>
+            <a:solidFill>
+              <a:srgbClr val="000000"/>
+            </a:solidFill>
+            <a:tailEnd len="med" type="triangle" w="med"/>
+          </a:ln>
+        </p:spPr>
+        <p:style>
+          <a:lnRef idx="0"/>
+          <a:fillRef idx="0"/>
+          <a:effectRef idx="0"/>
+          <a:fontRef idx="minor"/>
+        </p:style>
+      </p:sp>
+      <p:sp>
+        <p:nvSpPr>
+          <p:cNvPr id="90" name="Line 53"/>
+          <p:cNvSpPr/>
+          <p:nvPr/>
+        </p:nvSpPr>
+        <p:spPr>
+          <a:xfrm flipH="1" flipV="1">
+            <a:off x="8961120" y="857880"/>
+            <a:ext cx="12960" cy="1793880"/>
+          </a:xfrm>
+          <a:prstGeom prst="line">
+            <a:avLst/>
+          </a:prstGeom>
+          <a:ln>
+            <a:solidFill>
+              <a:srgbClr val="000000"/>
+            </a:solidFill>
+            <a:tailEnd len="med" type="triangle" w="med"/>
+          </a:ln>
+        </p:spPr>
+        <p:style>
+          <a:lnRef idx="0"/>
+          <a:fillRef idx="0"/>
+          <a:effectRef idx="0"/>
+          <a:fontRef idx="minor"/>
+        </p:style>
+      </p:sp>
+      <p:sp>
+        <p:nvSpPr>
+          <p:cNvPr id="91" name="Line 54"/>
+          <p:cNvSpPr/>
+          <p:nvPr/>
+        </p:nvSpPr>
+        <p:spPr>
+          <a:xfrm flipH="1">
+            <a:off x="7990200" y="2651760"/>
+            <a:ext cx="983880" cy="360"/>
+          </a:xfrm>
+          <a:prstGeom prst="line">
+            <a:avLst/>
+          </a:prstGeom>
+          <a:ln>
+            <a:solidFill>
+              <a:srgbClr val="000000"/>
+            </a:solidFill>
+            <a:tailEnd len="med" type="triangle" w="med"/>
+          </a:ln>
+        </p:spPr>
+        <p:style>
+          <a:lnRef idx="0"/>
+          <a:fillRef idx="0"/>
+          <a:effectRef idx="0"/>
+          <a:fontRef idx="minor"/>
+        </p:style>
+      </p:sp>
+      <p:sp>
+        <p:nvSpPr>
+          <p:cNvPr id="92" name="Line 55"/>
+          <p:cNvSpPr/>
+          <p:nvPr/>
+        </p:nvSpPr>
+        <p:spPr>
+          <a:xfrm>
+            <a:off x="4784760" y="2651760"/>
+            <a:ext cx="2017800" cy="360"/>
           </a:xfrm>
           <a:prstGeom prst="line">
             <a:avLst/>
@@ -2828,17 +3964,23 @@
             <a:tailEnd len="med" type="triangle" w="med"/>
           </a:ln>
         </p:spPr>
-      </p:cxnSp>
-      <p:cxnSp>
-        <p:nvCxnSpPr>
-          <p:cNvPr id="71" name="Line 31"/>
-          <p:cNvCxnSpPr/>
-          <p:nvPr/>
-        </p:nvCxnSpPr>
-        <p:spPr>
-          <a:xfrm>
-            <a:off x="0" y="0"/>
-            <a:ext cx="360" cy="360"/>
+        <p:style>
+          <a:lnRef idx="0"/>
+          <a:fillRef idx="0"/>
+          <a:effectRef idx="0"/>
+          <a:fontRef idx="minor"/>
+        </p:style>
+      </p:sp>
+      <p:sp>
+        <p:nvSpPr>
+          <p:cNvPr id="93" name="Line 56"/>
+          <p:cNvSpPr/>
+          <p:nvPr/>
+        </p:nvSpPr>
+        <p:spPr>
+          <a:xfrm flipH="1">
+            <a:off x="4612680" y="4261680"/>
+            <a:ext cx="1281240" cy="360"/>
           </a:xfrm>
           <a:prstGeom prst="line">
             <a:avLst/>
@@ -2847,21 +3989,26 @@
             <a:solidFill>
               <a:srgbClr val="000000"/>
             </a:solidFill>
-            <a:headEnd len="med" type="triangle" w="med"/>
             <a:tailEnd len="med" type="triangle" w="med"/>
           </a:ln>
         </p:spPr>
-      </p:cxnSp>
-      <p:cxnSp>
-        <p:nvCxnSpPr>
-          <p:cNvPr id="72" name="Line 32"/>
-          <p:cNvCxnSpPr/>
-          <p:nvPr/>
-        </p:nvCxnSpPr>
-        <p:spPr>
-          <a:xfrm>
-            <a:off x="0" y="0"/>
-            <a:ext cx="360" cy="360"/>
+        <p:style>
+          <a:lnRef idx="0"/>
+          <a:fillRef idx="0"/>
+          <a:effectRef idx="0"/>
+          <a:fontRef idx="minor"/>
+        </p:style>
+      </p:sp>
+      <p:sp>
+        <p:nvSpPr>
+          <p:cNvPr id="94" name="Line 57"/>
+          <p:cNvSpPr/>
+          <p:nvPr/>
+        </p:nvSpPr>
+        <p:spPr>
+          <a:xfrm flipH="1">
+            <a:off x="4630320" y="4678560"/>
+            <a:ext cx="673200" cy="360"/>
           </a:xfrm>
           <a:prstGeom prst="line">
             <a:avLst/>
@@ -2870,21 +4017,162 @@
             <a:solidFill>
               <a:srgbClr val="000000"/>
             </a:solidFill>
-            <a:headEnd len="med" type="triangle" w="med"/>
             <a:tailEnd len="med" type="triangle" w="med"/>
           </a:ln>
         </p:spPr>
-      </p:cxnSp>
-      <p:sp>
-        <p:nvSpPr>
-          <p:cNvPr id="73" name="TextShape 33"/>
-          <p:cNvSpPr txBox="1"/>
-          <p:nvPr/>
-        </p:nvSpPr>
-        <p:spPr>
-          <a:xfrm rot="16200000">
-            <a:off x="7959960" y="1875240"/>
-            <a:ext cx="1643760" cy="386280"/>
+        <p:style>
+          <a:lnRef idx="0"/>
+          <a:fillRef idx="0"/>
+          <a:effectRef idx="0"/>
+          <a:fontRef idx="minor"/>
+        </p:style>
+      </p:sp>
+      <p:sp>
+        <p:nvSpPr>
+          <p:cNvPr id="95" name="Line 58"/>
+          <p:cNvSpPr/>
+          <p:nvPr/>
+        </p:nvSpPr>
+        <p:spPr>
+          <a:xfrm flipV="1">
+            <a:off x="5303520" y="4353120"/>
+            <a:ext cx="360" cy="325440"/>
+          </a:xfrm>
+          <a:prstGeom prst="line">
+            <a:avLst/>
+          </a:prstGeom>
+          <a:ln>
+            <a:solidFill>
+              <a:srgbClr val="000000"/>
+            </a:solidFill>
+          </a:ln>
+        </p:spPr>
+        <p:style>
+          <a:lnRef idx="0"/>
+          <a:fillRef idx="0"/>
+          <a:effectRef idx="0"/>
+          <a:fontRef idx="minor"/>
+        </p:style>
+      </p:sp>
+      <p:sp>
+        <p:nvSpPr>
+          <p:cNvPr id="96" name="Line 59"/>
+          <p:cNvSpPr/>
+          <p:nvPr/>
+        </p:nvSpPr>
+        <p:spPr>
+          <a:xfrm>
+            <a:off x="5486400" y="4663440"/>
+            <a:ext cx="424080" cy="360"/>
+          </a:xfrm>
+          <a:prstGeom prst="line">
+            <a:avLst/>
+          </a:prstGeom>
+          <a:ln>
+            <a:solidFill>
+              <a:srgbClr val="000000"/>
+            </a:solidFill>
+            <a:tailEnd len="med" type="triangle" w="med"/>
+          </a:ln>
+        </p:spPr>
+        <p:style>
+          <a:lnRef idx="0"/>
+          <a:fillRef idx="0"/>
+          <a:effectRef idx="0"/>
+          <a:fontRef idx="minor"/>
+        </p:style>
+      </p:sp>
+      <p:sp>
+        <p:nvSpPr>
+          <p:cNvPr id="97" name="Line 60"/>
+          <p:cNvSpPr/>
+          <p:nvPr/>
+        </p:nvSpPr>
+        <p:spPr>
+          <a:xfrm flipV="1">
+            <a:off x="5486400" y="4663440"/>
+            <a:ext cx="360" cy="421200"/>
+          </a:xfrm>
+          <a:prstGeom prst="line">
+            <a:avLst/>
+          </a:prstGeom>
+          <a:ln>
+            <a:solidFill>
+              <a:srgbClr val="000000"/>
+            </a:solidFill>
+          </a:ln>
+        </p:spPr>
+        <p:style>
+          <a:lnRef idx="0"/>
+          <a:fillRef idx="0"/>
+          <a:effectRef idx="0"/>
+          <a:fontRef idx="minor"/>
+        </p:style>
+      </p:sp>
+      <p:sp>
+        <p:nvSpPr>
+          <p:cNvPr id="98" name="Line 61"/>
+          <p:cNvSpPr/>
+          <p:nvPr/>
+        </p:nvSpPr>
+        <p:spPr>
+          <a:xfrm flipH="1">
+            <a:off x="4624560" y="5084640"/>
+            <a:ext cx="861840" cy="360"/>
+          </a:xfrm>
+          <a:prstGeom prst="line">
+            <a:avLst/>
+          </a:prstGeom>
+          <a:ln>
+            <a:solidFill>
+              <a:srgbClr val="000000"/>
+            </a:solidFill>
+          </a:ln>
+        </p:spPr>
+        <p:style>
+          <a:lnRef idx="0"/>
+          <a:fillRef idx="0"/>
+          <a:effectRef idx="0"/>
+          <a:fontRef idx="minor"/>
+        </p:style>
+      </p:sp>
+      <p:sp>
+        <p:nvSpPr>
+          <p:cNvPr id="99" name="Line 62"/>
+          <p:cNvSpPr/>
+          <p:nvPr/>
+        </p:nvSpPr>
+        <p:spPr>
+          <a:xfrm flipH="1">
+            <a:off x="5303520" y="4353120"/>
+            <a:ext cx="590400" cy="360"/>
+          </a:xfrm>
+          <a:prstGeom prst="line">
+            <a:avLst/>
+          </a:prstGeom>
+          <a:ln>
+            <a:solidFill>
+              <a:srgbClr val="000000"/>
+            </a:solidFill>
+          </a:ln>
+        </p:spPr>
+        <p:style>
+          <a:lnRef idx="0"/>
+          <a:fillRef idx="0"/>
+          <a:effectRef idx="0"/>
+          <a:fontRef idx="minor"/>
+        </p:style>
+      </p:sp>
+      <p:sp>
+        <p:nvSpPr>
+          <p:cNvPr id="100" name="CustomShape 63"/>
+          <p:cNvSpPr/>
+          <p:nvPr/>
+        </p:nvSpPr>
+        <p:spPr>
+          <a:xfrm>
+            <a:off x="4937760" y="5029200"/>
+            <a:ext cx="717840" cy="237240"/>
           </a:xfrm>
           <a:prstGeom prst="rect">
             <a:avLst/>
@@ -2894,620 +4182,78 @@
             <a:noFill/>
           </a:ln>
         </p:spPr>
+        <p:style>
+          <a:lnRef idx="0"/>
+          <a:fillRef idx="0"/>
+          <a:effectRef idx="0"/>
+          <a:fontRef idx="minor"/>
+        </p:style>
         <p:txBody>
           <a:bodyPr lIns="90000" rIns="90000" tIns="45000" bIns="45000"/>
           <a:p>
-            <a:pPr algn="ctr"/>
+            <a:pPr>
+              <a:lnSpc>
+                <a:spcPct val="100000"/>
+              </a:lnSpc>
+            </a:pPr>
             <a:r>
               <a:rPr b="0" lang="en-US" sz="1050" spc="-1" strike="noStrike">
-                <a:latin typeface="Arial"/>
-              </a:rPr>
-              <a:t>tref or qref(send),</a:t>
-            </a:r>
-            <a:br/>
+                <a:solidFill>
+                  <a:srgbClr val="000000"/>
+                </a:solidFill>
+                <a:latin typeface="Arial"/>
+                <a:ea typeface="DejaVu Sans"/>
+              </a:rPr>
+              <a:t>(TCP/IP)</a:t>
+            </a:r>
+            <a:endParaRPr b="0" lang="en-US" sz="1050" spc="-1" strike="noStrike">
+              <a:latin typeface="Arial"/>
+            </a:endParaRPr>
+          </a:p>
+        </p:txBody>
+      </p:sp>
+      <p:sp>
+        <p:nvSpPr>
+          <p:cNvPr id="101" name="CustomShape 64"/>
+          <p:cNvSpPr/>
+          <p:nvPr/>
+        </p:nvSpPr>
+        <p:spPr>
+          <a:xfrm>
+            <a:off x="4937760" y="4663440"/>
+            <a:ext cx="677520" cy="237240"/>
+          </a:xfrm>
+          <a:prstGeom prst="rect">
+            <a:avLst/>
+          </a:prstGeom>
+          <a:noFill/>
+          <a:ln>
+            <a:noFill/>
+          </a:ln>
+        </p:spPr>
+        <p:style>
+          <a:lnRef idx="0"/>
+          <a:fillRef idx="0"/>
+          <a:effectRef idx="0"/>
+          <a:fontRef idx="minor"/>
+        </p:style>
+        <p:txBody>
+          <a:bodyPr lIns="90000" rIns="90000" tIns="45000" bIns="45000"/>
+          <a:p>
+            <a:pPr>
+              <a:lnSpc>
+                <a:spcPct val="100000"/>
+              </a:lnSpc>
+            </a:pPr>
             <a:r>
               <a:rPr b="0" lang="en-US" sz="1050" spc="-1" strike="noStrike">
-                <a:latin typeface="Arial"/>
-              </a:rPr>
-              <a:t>q(receive)</a:t>
-            </a:r>
-            <a:endParaRPr b="0" lang="en-US" sz="1050" spc="-1" strike="noStrike">
-              <a:latin typeface="Arial"/>
-            </a:endParaRPr>
-          </a:p>
-        </p:txBody>
-      </p:sp>
-      <p:cxnSp>
-        <p:nvCxnSpPr>
-          <p:cNvPr id="74" name="Line 34"/>
-          <p:cNvCxnSpPr/>
-          <p:nvPr/>
-        </p:nvCxnSpPr>
-        <p:spPr>
-          <a:xfrm>
-            <a:off x="0" y="0"/>
-            <a:ext cx="360" cy="360"/>
-          </a:xfrm>
-          <a:prstGeom prst="line">
-            <a:avLst/>
-          </a:prstGeom>
-          <a:ln>
-            <a:solidFill>
-              <a:srgbClr val="000000"/>
-            </a:solidFill>
-            <a:headEnd len="med" type="triangle" w="med"/>
-            <a:tailEnd len="med" type="triangle" w="med"/>
-          </a:ln>
-        </p:spPr>
-      </p:cxnSp>
-      <p:cxnSp>
-        <p:nvCxnSpPr>
-          <p:cNvPr id="75" name="Line 35"/>
-          <p:cNvCxnSpPr/>
-          <p:nvPr/>
-        </p:nvCxnSpPr>
-        <p:spPr>
-          <a:xfrm>
-            <a:off x="0" y="0"/>
-            <a:ext cx="360" cy="360"/>
-          </a:xfrm>
-          <a:prstGeom prst="line">
-            <a:avLst/>
-          </a:prstGeom>
-          <a:ln>
-            <a:solidFill>
-              <a:srgbClr val="000000"/>
-            </a:solidFill>
-            <a:custDash/>
-            <a:headEnd len="med" type="triangle" w="med"/>
-            <a:tailEnd len="med" type="triangle" w="med"/>
-          </a:ln>
-        </p:spPr>
-      </p:cxnSp>
-      <p:cxnSp>
-        <p:nvCxnSpPr>
-          <p:cNvPr id="76" name="Line 36"/>
-          <p:cNvCxnSpPr/>
-          <p:nvPr/>
-        </p:nvCxnSpPr>
-        <p:spPr>
-          <a:xfrm>
-            <a:off x="0" y="0"/>
-            <a:ext cx="360" cy="360"/>
-          </a:xfrm>
-          <a:prstGeom prst="line">
-            <a:avLst/>
-          </a:prstGeom>
-          <a:ln>
-            <a:solidFill>
-              <a:srgbClr val="000000"/>
-            </a:solidFill>
-            <a:custDash/>
-            <a:headEnd len="med" type="triangle" w="med"/>
-            <a:tailEnd len="med" type="triangle" w="med"/>
-          </a:ln>
-        </p:spPr>
-      </p:cxnSp>
-      <p:cxnSp>
-        <p:nvCxnSpPr>
-          <p:cNvPr id="77" name="Line 37"/>
-          <p:cNvCxnSpPr/>
-          <p:nvPr/>
-        </p:nvCxnSpPr>
-        <p:spPr>
-          <a:xfrm>
-            <a:off x="0" y="0"/>
-            <a:ext cx="360" cy="360"/>
-          </a:xfrm>
-          <a:prstGeom prst="line">
-            <a:avLst/>
-          </a:prstGeom>
-          <a:ln>
-            <a:solidFill>
-              <a:srgbClr val="000000"/>
-            </a:solidFill>
-            <a:tailEnd len="med" type="triangle" w="med"/>
-          </a:ln>
-        </p:spPr>
-      </p:cxnSp>
-      <p:cxnSp>
-        <p:nvCxnSpPr>
-          <p:cNvPr id="78" name="Line 38"/>
-          <p:cNvCxnSpPr/>
-          <p:nvPr/>
-        </p:nvCxnSpPr>
-        <p:spPr>
-          <a:xfrm>
-            <a:off x="0" y="0"/>
-            <a:ext cx="360" cy="360"/>
-          </a:xfrm>
-          <a:prstGeom prst="line">
-            <a:avLst/>
-          </a:prstGeom>
-          <a:ln>
-            <a:solidFill>
-              <a:srgbClr val="000000"/>
-            </a:solidFill>
-            <a:tailEnd len="med" type="triangle" w="med"/>
-          </a:ln>
-        </p:spPr>
-      </p:cxnSp>
-      <p:cxnSp>
-        <p:nvCxnSpPr>
-          <p:cNvPr id="79" name="Line 39"/>
-          <p:cNvCxnSpPr/>
-          <p:nvPr/>
-        </p:nvCxnSpPr>
-        <p:spPr>
-          <a:xfrm>
-            <a:off x="0" y="0"/>
-            <a:ext cx="360" cy="360"/>
-          </a:xfrm>
-          <a:prstGeom prst="line">
-            <a:avLst/>
-          </a:prstGeom>
-          <a:ln>
-            <a:solidFill>
-              <a:srgbClr val="000000"/>
-            </a:solidFill>
-            <a:headEnd len="med" type="triangle" w="med"/>
-            <a:tailEnd len="med" type="triangle" w="med"/>
-          </a:ln>
-        </p:spPr>
-      </p:cxnSp>
-      <p:sp>
-        <p:nvSpPr>
-          <p:cNvPr id="80" name="TextShape 40"/>
-          <p:cNvSpPr txBox="1"/>
-          <p:nvPr/>
-        </p:nvSpPr>
-        <p:spPr>
-          <a:xfrm>
-            <a:off x="3019680" y="3124440"/>
-            <a:ext cx="1643760" cy="238320"/>
-          </a:xfrm>
-          <a:prstGeom prst="rect">
-            <a:avLst/>
-          </a:prstGeom>
-          <a:noFill/>
-          <a:ln>
-            <a:noFill/>
-          </a:ln>
-        </p:spPr>
-        <p:txBody>
-          <a:bodyPr lIns="90000" rIns="90000" tIns="45000" bIns="45000"/>
-          <a:p>
-            <a:pPr algn="ctr"/>
-            <a:r>
-              <a:rPr b="0" lang="en-US" sz="1050" spc="-1" strike="noStrike">
-                <a:latin typeface="Arial"/>
-              </a:rPr>
-              <a:t>xref, ctrl_params, q</a:t>
-            </a:r>
-            <a:endParaRPr b="0" lang="en-US" sz="1050" spc="-1" strike="noStrike">
-              <a:latin typeface="Arial"/>
-            </a:endParaRPr>
-          </a:p>
-        </p:txBody>
-      </p:sp>
-      <p:sp>
-        <p:nvSpPr>
-          <p:cNvPr id="81" name="TextShape 41"/>
-          <p:cNvSpPr txBox="1"/>
-          <p:nvPr/>
-        </p:nvSpPr>
-        <p:spPr>
-          <a:xfrm>
-            <a:off x="1737360" y="4101840"/>
-            <a:ext cx="1098000" cy="238320"/>
-          </a:xfrm>
-          <a:prstGeom prst="rect">
-            <a:avLst/>
-          </a:prstGeom>
-          <a:noFill/>
-          <a:ln>
-            <a:noFill/>
-          </a:ln>
-        </p:spPr>
-        <p:txBody>
-          <a:bodyPr lIns="90000" rIns="90000" tIns="45000" bIns="45000"/>
-          <a:p>
-            <a:pPr algn="ctr"/>
-            <a:r>
-              <a:rPr b="0" lang="en-US" sz="1050" spc="-1" strike="noStrike">
-                <a:latin typeface="Arial"/>
-              </a:rPr>
-              <a:t>ctrl_params</a:t>
-            </a:r>
-            <a:endParaRPr b="0" lang="en-US" sz="1050" spc="-1" strike="noStrike">
-              <a:latin typeface="Arial"/>
-            </a:endParaRPr>
-          </a:p>
-        </p:txBody>
-      </p:sp>
-      <p:sp>
-        <p:nvSpPr>
-          <p:cNvPr id="82" name="TextShape 42"/>
-          <p:cNvSpPr txBox="1"/>
-          <p:nvPr/>
-        </p:nvSpPr>
-        <p:spPr>
-          <a:xfrm>
-            <a:off x="1728720" y="4461840"/>
-            <a:ext cx="1098000" cy="238320"/>
-          </a:xfrm>
-          <a:prstGeom prst="rect">
-            <a:avLst/>
-          </a:prstGeom>
-          <a:noFill/>
-          <a:ln>
-            <a:noFill/>
-          </a:ln>
-        </p:spPr>
-        <p:txBody>
-          <a:bodyPr lIns="90000" rIns="90000" tIns="45000" bIns="45000"/>
-          <a:p>
-            <a:pPr algn="ctr"/>
-            <a:r>
-              <a:rPr b="0" lang="en-US" sz="1050" spc="-1" strike="noStrike">
-                <a:latin typeface="Arial"/>
-              </a:rPr>
-              <a:t>xref</a:t>
-            </a:r>
-            <a:endParaRPr b="0" lang="en-US" sz="1050" spc="-1" strike="noStrike">
-              <a:latin typeface="Arial"/>
-            </a:endParaRPr>
-          </a:p>
-        </p:txBody>
-      </p:sp>
-      <p:sp>
-        <p:nvSpPr>
-          <p:cNvPr id="83" name="TextShape 43"/>
-          <p:cNvSpPr txBox="1"/>
-          <p:nvPr/>
-        </p:nvSpPr>
-        <p:spPr>
-          <a:xfrm>
-            <a:off x="3162600" y="4973760"/>
-            <a:ext cx="1463040" cy="238680"/>
-          </a:xfrm>
-          <a:prstGeom prst="rect">
-            <a:avLst/>
-          </a:prstGeom>
-          <a:noFill/>
-          <a:ln>
-            <a:solidFill>
-              <a:srgbClr val="3465a4"/>
-            </a:solidFill>
-          </a:ln>
-        </p:spPr>
-        <p:txBody>
-          <a:bodyPr lIns="90000" rIns="90000" tIns="45000" bIns="45000"/>
-          <a:p>
-            <a:pPr algn="ctr"/>
-            <a:r>
-              <a:rPr b="0" lang="en-US" sz="1050" spc="-1" strike="noStrike">
-                <a:latin typeface="Arial"/>
-              </a:rPr>
-              <a:t>state_observer</a:t>
-            </a:r>
-            <a:endParaRPr b="0" lang="en-US" sz="1050" spc="-1" strike="noStrike">
-              <a:latin typeface="Arial"/>
-            </a:endParaRPr>
-          </a:p>
-        </p:txBody>
-      </p:sp>
-      <p:cxnSp>
-        <p:nvCxnSpPr>
-          <p:cNvPr id="84" name="Line 44"/>
-          <p:cNvCxnSpPr/>
-          <p:nvPr/>
-        </p:nvCxnSpPr>
-        <p:spPr>
-          <a:xfrm>
-            <a:off x="0" y="0"/>
-            <a:ext cx="360" cy="360"/>
-          </a:xfrm>
-          <a:prstGeom prst="line">
-            <a:avLst/>
-          </a:prstGeom>
-          <a:ln>
-            <a:solidFill>
-              <a:srgbClr val="000000"/>
-            </a:solidFill>
-            <a:tailEnd len="med" type="triangle" w="med"/>
-          </a:ln>
-        </p:spPr>
-      </p:cxnSp>
-      <p:sp>
-        <p:nvSpPr>
-          <p:cNvPr id="85" name="TextShape 45"/>
-          <p:cNvSpPr txBox="1"/>
-          <p:nvPr/>
-        </p:nvSpPr>
-        <p:spPr>
-          <a:xfrm>
-            <a:off x="1738080" y="4874760"/>
-            <a:ext cx="1098000" cy="238320"/>
-          </a:xfrm>
-          <a:prstGeom prst="rect">
-            <a:avLst/>
-          </a:prstGeom>
-          <a:noFill/>
-          <a:ln>
-            <a:noFill/>
-          </a:ln>
-        </p:spPr>
-        <p:txBody>
-          <a:bodyPr lIns="90000" rIns="90000" tIns="45000" bIns="45000"/>
-          <a:p>
-            <a:pPr algn="ctr"/>
-            <a:r>
-              <a:rPr b="0" lang="en-US" sz="1050" spc="-1" strike="noStrike">
-                <a:latin typeface="Arial"/>
-              </a:rPr>
-              <a:t>q</a:t>
-            </a:r>
-            <a:endParaRPr b="0" lang="en-US" sz="1050" spc="-1" strike="noStrike">
-              <a:latin typeface="Arial"/>
-            </a:endParaRPr>
-          </a:p>
-        </p:txBody>
-      </p:sp>
-      <p:cxnSp>
-        <p:nvCxnSpPr>
-          <p:cNvPr id="86" name="Line 46"/>
-          <p:cNvCxnSpPr/>
-          <p:nvPr/>
-        </p:nvCxnSpPr>
-        <p:spPr>
-          <a:xfrm>
-            <a:off x="0" y="0"/>
-            <a:ext cx="360" cy="360"/>
-          </a:xfrm>
-          <a:prstGeom prst="line">
-            <a:avLst/>
-          </a:prstGeom>
-          <a:ln>
-            <a:solidFill>
-              <a:srgbClr val="000000"/>
-            </a:solidFill>
-            <a:tailEnd len="med" type="triangle" w="med"/>
-          </a:ln>
-        </p:spPr>
-      </p:cxnSp>
-      <p:cxnSp>
-        <p:nvCxnSpPr>
-          <p:cNvPr id="87" name="Line 47"/>
-          <p:cNvCxnSpPr/>
-          <p:nvPr/>
-        </p:nvCxnSpPr>
-        <p:spPr>
-          <a:xfrm>
-            <a:off x="0" y="0"/>
-            <a:ext cx="360" cy="360"/>
-          </a:xfrm>
-          <a:prstGeom prst="line">
-            <a:avLst/>
-          </a:prstGeom>
-          <a:ln>
-            <a:solidFill>
-              <a:srgbClr val="000000"/>
-            </a:solidFill>
-            <a:custDash/>
-            <a:tailEnd len="med" type="triangle" w="med"/>
-          </a:ln>
-        </p:spPr>
-      </p:cxnSp>
-      <p:sp>
-        <p:nvSpPr>
-          <p:cNvPr id="88" name="Line 48"/>
-          <p:cNvSpPr/>
-          <p:nvPr/>
-        </p:nvSpPr>
-        <p:spPr>
-          <a:xfrm>
-            <a:off x="8229600" y="4297680"/>
-            <a:ext cx="822960" cy="0"/>
-          </a:xfrm>
-          <a:prstGeom prst="line">
-            <a:avLst/>
-          </a:prstGeom>
-          <a:ln>
-            <a:solidFill>
-              <a:srgbClr val="000000"/>
-            </a:solidFill>
-            <a:custDash/>
-            <a:tailEnd len="med" type="triangle" w="med"/>
-          </a:ln>
-        </p:spPr>
-        <p:style>
-          <a:lnRef idx="0"/>
-          <a:fillRef idx="0"/>
-          <a:effectRef idx="0"/>
-          <a:fontRef idx="minor"/>
-        </p:style>
-      </p:sp>
-      <p:sp>
-        <p:nvSpPr>
-          <p:cNvPr id="89" name="TextShape 49"/>
-          <p:cNvSpPr txBox="1"/>
-          <p:nvPr/>
-        </p:nvSpPr>
-        <p:spPr>
-          <a:xfrm>
-            <a:off x="9069120" y="4186440"/>
-            <a:ext cx="678960" cy="238680"/>
-          </a:xfrm>
-          <a:prstGeom prst="rect">
-            <a:avLst/>
-          </a:prstGeom>
-          <a:noFill/>
-          <a:ln>
-            <a:noFill/>
-          </a:ln>
-        </p:spPr>
-        <p:txBody>
-          <a:bodyPr lIns="90000" rIns="90000" tIns="45000" bIns="45000"/>
-          <a:p>
-            <a:r>
-              <a:rPr b="0" lang="en-US" sz="1050" spc="-1" strike="noStrike">
-                <a:latin typeface="Arial"/>
-              </a:rPr>
-              <a:t>TCP/IP</a:t>
-            </a:r>
-            <a:endParaRPr b="0" lang="en-US" sz="1050" spc="-1" strike="noStrike">
-              <a:latin typeface="Arial"/>
-            </a:endParaRPr>
-          </a:p>
-        </p:txBody>
-      </p:sp>
-      <p:sp>
-        <p:nvSpPr>
-          <p:cNvPr id="90" name="Line 50"/>
-          <p:cNvSpPr/>
-          <p:nvPr/>
-        </p:nvSpPr>
-        <p:spPr>
-          <a:xfrm>
-            <a:off x="8229600" y="4585680"/>
-            <a:ext cx="822960" cy="0"/>
-          </a:xfrm>
-          <a:prstGeom prst="line">
-            <a:avLst/>
-          </a:prstGeom>
-          <a:ln>
-            <a:solidFill>
-              <a:srgbClr val="000000"/>
-            </a:solidFill>
-            <a:custDash/>
-            <a:tailEnd len="med" type="triangle" w="med"/>
-          </a:ln>
-        </p:spPr>
-        <p:style>
-          <a:lnRef idx="0"/>
-          <a:fillRef idx="0"/>
-          <a:effectRef idx="0"/>
-          <a:fontRef idx="minor"/>
-        </p:style>
-      </p:sp>
-      <p:sp>
-        <p:nvSpPr>
-          <p:cNvPr id="91" name="TextShape 51"/>
-          <p:cNvSpPr txBox="1"/>
-          <p:nvPr/>
-        </p:nvSpPr>
-        <p:spPr>
-          <a:xfrm>
-            <a:off x="9069120" y="4461120"/>
-            <a:ext cx="678960" cy="238680"/>
-          </a:xfrm>
-          <a:prstGeom prst="rect">
-            <a:avLst/>
-          </a:prstGeom>
-          <a:noFill/>
-          <a:ln>
-            <a:noFill/>
-          </a:ln>
-        </p:spPr>
-        <p:txBody>
-          <a:bodyPr lIns="90000" rIns="90000" tIns="45000" bIns="45000"/>
-          <a:p>
-            <a:r>
-              <a:rPr b="0" lang="en-US" sz="1050" spc="-1" strike="noStrike">
-                <a:latin typeface="Arial"/>
-              </a:rPr>
-              <a:t>UDP</a:t>
-            </a:r>
-            <a:endParaRPr b="0" lang="en-US" sz="1050" spc="-1" strike="noStrike">
-              <a:latin typeface="Arial"/>
-            </a:endParaRPr>
-          </a:p>
-        </p:txBody>
-      </p:sp>
-      <p:sp>
-        <p:nvSpPr>
-          <p:cNvPr id="92" name="Line 52"/>
-          <p:cNvSpPr/>
-          <p:nvPr/>
-        </p:nvSpPr>
-        <p:spPr>
-          <a:xfrm>
-            <a:off x="1093680" y="2175120"/>
-            <a:ext cx="766080" cy="0"/>
-          </a:xfrm>
-          <a:prstGeom prst="line">
-            <a:avLst/>
-          </a:prstGeom>
-          <a:ln>
-            <a:solidFill>
-              <a:srgbClr val="000000"/>
-            </a:solidFill>
-            <a:tailEnd len="med" type="triangle" w="med"/>
-          </a:ln>
-        </p:spPr>
-        <p:style>
-          <a:lnRef idx="0"/>
-          <a:fillRef idx="0"/>
-          <a:effectRef idx="0"/>
-          <a:fontRef idx="minor"/>
-        </p:style>
-      </p:sp>
-      <p:sp>
-        <p:nvSpPr>
-          <p:cNvPr id="93" name="Line 53"/>
-          <p:cNvSpPr/>
-          <p:nvPr/>
-        </p:nvSpPr>
-        <p:spPr>
-          <a:xfrm>
-            <a:off x="1091520" y="2505240"/>
-            <a:ext cx="766080" cy="0"/>
-          </a:xfrm>
-          <a:prstGeom prst="line">
-            <a:avLst/>
-          </a:prstGeom>
-          <a:ln>
-            <a:solidFill>
-              <a:srgbClr val="000000"/>
-            </a:solidFill>
-            <a:tailEnd len="med" type="triangle" w="med"/>
-          </a:ln>
-        </p:spPr>
-        <p:style>
-          <a:lnRef idx="0"/>
-          <a:fillRef idx="0"/>
-          <a:effectRef idx="0"/>
-          <a:fontRef idx="minor"/>
-        </p:style>
-      </p:sp>
-      <p:sp>
-        <p:nvSpPr>
-          <p:cNvPr id="94" name="TextShape 54"/>
-          <p:cNvSpPr txBox="1"/>
-          <p:nvPr/>
-        </p:nvSpPr>
-        <p:spPr>
-          <a:xfrm>
-            <a:off x="7736400" y="492840"/>
-            <a:ext cx="493200" cy="238680"/>
-          </a:xfrm>
-          <a:prstGeom prst="rect">
-            <a:avLst/>
-          </a:prstGeom>
-          <a:noFill/>
-          <a:ln>
-            <a:noFill/>
-          </a:ln>
-        </p:spPr>
-        <p:txBody>
-          <a:bodyPr lIns="90000" rIns="90000" tIns="45000" bIns="45000"/>
-          <a:p>
-            <a:r>
-              <a:rPr b="0" lang="en-US" sz="1050" spc="-1" strike="noStrike">
-                <a:latin typeface="Arial"/>
-              </a:rPr>
-              <a:t>OR</a:t>
+                <a:solidFill>
+                  <a:srgbClr val="000000"/>
+                </a:solidFill>
+                <a:latin typeface="Arial"/>
+                <a:ea typeface="DejaVu Sans"/>
+              </a:rPr>
+              <a:t>(UDP)</a:t>
             </a:r>
             <a:endParaRPr b="0" lang="en-US" sz="1050" spc="-1" strike="noStrike">
               <a:latin typeface="Arial"/>
@@ -3524,264 +4270,6 @@
           <p:childTnLst>
             <p:seq>
               <p:cTn id="2" dur="indefinite" nodeType="mainSeq"/>
-              <p:prevCondLst>
-                <p:cond delay="0" evt="onPrev">
-                  <p:tgtEl>
-                    <p:sldTgt/>
-                  </p:tgtEl>
-                </p:cond>
-              </p:prevCondLst>
-              <p:nextCondLst>
-                <p:cond delay="0" evt="onNext">
-                  <p:tgtEl>
-                    <p:sldTgt/>
-                  </p:tgtEl>
-                </p:cond>
-              </p:nextCondLst>
-            </p:seq>
-          </p:childTnLst>
-        </p:cTn>
-      </p:par>
-    </p:tnLst>
-  </p:timing>
-</p:sld>
-</file>
-
-<file path=ppt/slides/slide2.xml><?xml version="1.0" encoding="utf-8"?>
-<p:sld xmlns:a="http://schemas.openxmlformats.org/drawingml/2006/main" xmlns:p="http://schemas.openxmlformats.org/presentationml/2006/main" xmlns:r="http://schemas.openxmlformats.org/officeDocument/2006/relationships" xmlns:p14="http://schemas.microsoft.com/office/powerpoint/2010/main" xmlns:p15="http://schemas.microsoft.com/office/powerpoint/2012/main" xmlns:mc="http://schemas.openxmlformats.org/markup-compatibility/2006">
-  <p:cSld>
-    <p:spTree>
-      <p:nvGrpSpPr>
-        <p:cNvPr id="1" name=""/>
-        <p:cNvGrpSpPr/>
-        <p:nvPr/>
-      </p:nvGrpSpPr>
-      <p:grpSpPr>
-        <a:xfrm>
-          <a:off x="0" y="0"/>
-          <a:ext cx="0" cy="0"/>
-          <a:chOff x="0" y="0"/>
-          <a:chExt cx="0" cy="0"/>
-        </a:xfrm>
-      </p:grpSpPr>
-      <p:sp>
-        <p:nvSpPr>
-          <p:cNvPr id="95" name="TextShape 1"/>
-          <p:cNvSpPr txBox="1"/>
-          <p:nvPr/>
-        </p:nvSpPr>
-        <p:spPr>
-          <a:xfrm>
-            <a:off x="504000" y="226080"/>
-            <a:ext cx="9071640" cy="946440"/>
-          </a:xfrm>
-          <a:prstGeom prst="rect">
-            <a:avLst/>
-          </a:prstGeom>
-          <a:noFill/>
-          <a:ln>
-            <a:noFill/>
-          </a:ln>
-        </p:spPr>
-        <p:txBody>
-          <a:bodyPr lIns="0" rIns="0" tIns="0" bIns="0" anchor="ctr"/>
-          <a:p>
-            <a:pPr algn="ctr"/>
-            <a:endParaRPr b="0" lang="en-US" sz="4400" spc="-1" strike="noStrike">
-              <a:latin typeface="Arial"/>
-            </a:endParaRPr>
-          </a:p>
-        </p:txBody>
-      </p:sp>
-      <p:sp>
-        <p:nvSpPr>
-          <p:cNvPr id="96" name="TextShape 2"/>
-          <p:cNvSpPr txBox="1"/>
-          <p:nvPr/>
-        </p:nvSpPr>
-        <p:spPr>
-          <a:xfrm>
-            <a:off x="504000" y="1326600"/>
-            <a:ext cx="2920680" cy="1568160"/>
-          </a:xfrm>
-          <a:prstGeom prst="rect">
-            <a:avLst/>
-          </a:prstGeom>
-          <a:noFill/>
-          <a:ln>
-            <a:noFill/>
-          </a:ln>
-        </p:spPr>
-        <p:txBody>
-          <a:bodyPr lIns="0" rIns="0" tIns="0" bIns="0">
-            <a:normAutofit/>
-          </a:bodyPr>
-          <a:p>
-            <a:endParaRPr b="0" lang="en-US" sz="3200" spc="-1" strike="noStrike">
-              <a:latin typeface="Arial"/>
-            </a:endParaRPr>
-          </a:p>
-        </p:txBody>
-      </p:sp>
-      <p:sp>
-        <p:nvSpPr>
-          <p:cNvPr id="97" name="TextShape 3"/>
-          <p:cNvSpPr txBox="1"/>
-          <p:nvPr/>
-        </p:nvSpPr>
-        <p:spPr>
-          <a:xfrm>
-            <a:off x="3571200" y="1326600"/>
-            <a:ext cx="2920680" cy="1568160"/>
-          </a:xfrm>
-          <a:prstGeom prst="rect">
-            <a:avLst/>
-          </a:prstGeom>
-          <a:noFill/>
-          <a:ln>
-            <a:noFill/>
-          </a:ln>
-        </p:spPr>
-        <p:txBody>
-          <a:bodyPr lIns="0" rIns="0" tIns="0" bIns="0">
-            <a:normAutofit/>
-          </a:bodyPr>
-          <a:p>
-            <a:endParaRPr b="0" lang="en-US" sz="3200" spc="-1" strike="noStrike">
-              <a:latin typeface="Arial"/>
-            </a:endParaRPr>
-          </a:p>
-        </p:txBody>
-      </p:sp>
-      <p:sp>
-        <p:nvSpPr>
-          <p:cNvPr id="98" name="TextShape 4"/>
-          <p:cNvSpPr txBox="1"/>
-          <p:nvPr/>
-        </p:nvSpPr>
-        <p:spPr>
-          <a:xfrm>
-            <a:off x="6638040" y="1326600"/>
-            <a:ext cx="2920680" cy="1568160"/>
-          </a:xfrm>
-          <a:prstGeom prst="rect">
-            <a:avLst/>
-          </a:prstGeom>
-          <a:noFill/>
-          <a:ln>
-            <a:noFill/>
-          </a:ln>
-        </p:spPr>
-        <p:txBody>
-          <a:bodyPr lIns="0" rIns="0" tIns="0" bIns="0">
-            <a:normAutofit/>
-          </a:bodyPr>
-          <a:p>
-            <a:endParaRPr b="0" lang="en-US" sz="3200" spc="-1" strike="noStrike">
-              <a:latin typeface="Arial"/>
-            </a:endParaRPr>
-          </a:p>
-        </p:txBody>
-      </p:sp>
-      <p:sp>
-        <p:nvSpPr>
-          <p:cNvPr id="99" name="TextShape 5"/>
-          <p:cNvSpPr txBox="1"/>
-          <p:nvPr/>
-        </p:nvSpPr>
-        <p:spPr>
-          <a:xfrm>
-            <a:off x="504000" y="3044160"/>
-            <a:ext cx="2920680" cy="1568160"/>
-          </a:xfrm>
-          <a:prstGeom prst="rect">
-            <a:avLst/>
-          </a:prstGeom>
-          <a:noFill/>
-          <a:ln>
-            <a:noFill/>
-          </a:ln>
-        </p:spPr>
-        <p:txBody>
-          <a:bodyPr lIns="0" rIns="0" tIns="0" bIns="0">
-            <a:normAutofit/>
-          </a:bodyPr>
-          <a:p>
-            <a:endParaRPr b="0" lang="en-US" sz="3200" spc="-1" strike="noStrike">
-              <a:latin typeface="Arial"/>
-            </a:endParaRPr>
-          </a:p>
-        </p:txBody>
-      </p:sp>
-      <p:sp>
-        <p:nvSpPr>
-          <p:cNvPr id="100" name="TextShape 6"/>
-          <p:cNvSpPr txBox="1"/>
-          <p:nvPr/>
-        </p:nvSpPr>
-        <p:spPr>
-          <a:xfrm>
-            <a:off x="3571200" y="3044160"/>
-            <a:ext cx="2920680" cy="1568160"/>
-          </a:xfrm>
-          <a:prstGeom prst="rect">
-            <a:avLst/>
-          </a:prstGeom>
-          <a:noFill/>
-          <a:ln>
-            <a:noFill/>
-          </a:ln>
-        </p:spPr>
-        <p:txBody>
-          <a:bodyPr lIns="0" rIns="0" tIns="0" bIns="0">
-            <a:normAutofit/>
-          </a:bodyPr>
-          <a:p>
-            <a:endParaRPr b="0" lang="en-US" sz="3200" spc="-1" strike="noStrike">
-              <a:latin typeface="Arial"/>
-            </a:endParaRPr>
-          </a:p>
-        </p:txBody>
-      </p:sp>
-      <p:sp>
-        <p:nvSpPr>
-          <p:cNvPr id="101" name="TextShape 7"/>
-          <p:cNvSpPr txBox="1"/>
-          <p:nvPr/>
-        </p:nvSpPr>
-        <p:spPr>
-          <a:xfrm>
-            <a:off x="6638040" y="3044160"/>
-            <a:ext cx="2920680" cy="1568160"/>
-          </a:xfrm>
-          <a:prstGeom prst="rect">
-            <a:avLst/>
-          </a:prstGeom>
-          <a:noFill/>
-          <a:ln>
-            <a:noFill/>
-          </a:ln>
-        </p:spPr>
-        <p:txBody>
-          <a:bodyPr lIns="0" rIns="0" tIns="0" bIns="0">
-            <a:normAutofit/>
-          </a:bodyPr>
-          <a:p>
-            <a:endParaRPr b="0" lang="en-US" sz="3200" spc="-1" strike="noStrike">
-              <a:latin typeface="Arial"/>
-            </a:endParaRPr>
-          </a:p>
-        </p:txBody>
-      </p:sp>
-    </p:spTree>
-  </p:cSld>
-  <p:timing>
-    <p:tnLst>
-      <p:par>
-        <p:cTn id="3" dur="indefinite" restart="never" nodeType="tmRoot">
-          <p:childTnLst>
-            <p:seq>
-              <p:cTn id="4" dur="indefinite" nodeType="mainSeq"/>
               <p:prevCondLst>
                 <p:cond delay="0" evt="onPrev">
                   <p:tgtEl>

</xml_diff>